<commit_message>
adding a bunch of slides
</commit_message>
<xml_diff>
--- a/slides/01-02-GraphsDFSTopoSCC.pptx
+++ b/slides/01-02-GraphsDFSTopoSCC.pptx
@@ -5,7 +5,7 @@
     <p:sldMasterId id="2147483674" r:id="rId1"/>
   </p:sldMasterIdLst>
   <p:notesMasterIdLst>
-    <p:notesMasterId r:id="rId44"/>
+    <p:notesMasterId r:id="rId43"/>
   </p:notesMasterIdLst>
   <p:sldIdLst>
     <p:sldId id="517" r:id="rId2"/>
@@ -27,29 +27,28 @@
     <p:sldId id="350" r:id="rId18"/>
     <p:sldId id="366" r:id="rId19"/>
     <p:sldId id="367" r:id="rId20"/>
-    <p:sldId id="494" r:id="rId21"/>
-    <p:sldId id="392" r:id="rId22"/>
-    <p:sldId id="404" r:id="rId23"/>
-    <p:sldId id="405" r:id="rId24"/>
-    <p:sldId id="533" r:id="rId25"/>
-    <p:sldId id="520" r:id="rId26"/>
-    <p:sldId id="488" r:id="rId27"/>
-    <p:sldId id="353" r:id="rId28"/>
-    <p:sldId id="402" r:id="rId29"/>
-    <p:sldId id="399" r:id="rId30"/>
-    <p:sldId id="400" r:id="rId31"/>
-    <p:sldId id="356" r:id="rId32"/>
-    <p:sldId id="357" r:id="rId33"/>
-    <p:sldId id="531" r:id="rId34"/>
-    <p:sldId id="522" r:id="rId35"/>
-    <p:sldId id="523" r:id="rId36"/>
-    <p:sldId id="524" r:id="rId37"/>
-    <p:sldId id="525" r:id="rId38"/>
-    <p:sldId id="527" r:id="rId39"/>
-    <p:sldId id="528" r:id="rId40"/>
-    <p:sldId id="529" r:id="rId41"/>
-    <p:sldId id="526" r:id="rId42"/>
-    <p:sldId id="532" r:id="rId43"/>
+    <p:sldId id="392" r:id="rId21"/>
+    <p:sldId id="404" r:id="rId22"/>
+    <p:sldId id="405" r:id="rId23"/>
+    <p:sldId id="533" r:id="rId24"/>
+    <p:sldId id="520" r:id="rId25"/>
+    <p:sldId id="488" r:id="rId26"/>
+    <p:sldId id="353" r:id="rId27"/>
+    <p:sldId id="402" r:id="rId28"/>
+    <p:sldId id="399" r:id="rId29"/>
+    <p:sldId id="400" r:id="rId30"/>
+    <p:sldId id="356" r:id="rId31"/>
+    <p:sldId id="357" r:id="rId32"/>
+    <p:sldId id="531" r:id="rId33"/>
+    <p:sldId id="522" r:id="rId34"/>
+    <p:sldId id="523" r:id="rId35"/>
+    <p:sldId id="524" r:id="rId36"/>
+    <p:sldId id="525" r:id="rId37"/>
+    <p:sldId id="527" r:id="rId38"/>
+    <p:sldId id="528" r:id="rId39"/>
+    <p:sldId id="529" r:id="rId40"/>
+    <p:sldId id="526" r:id="rId41"/>
+    <p:sldId id="532" r:id="rId42"/>
   </p:sldIdLst>
   <p:sldSz cx="12192000" cy="6858000"/>
   <p:notesSz cx="6858000" cy="9144000"/>
@@ -249,7 +248,7 @@
           <a:p>
             <a:fld id="{9A9F7FD5-2840-4607-A4CD-0A8A66D9D61D}" type="datetimeFigureOut">
               <a:rPr lang="en-US" smtClean="0"/>
-              <a:t>8/25/22</a:t>
+              <a:t>8/31/22</a:t>
             </a:fld>
             <a:endParaRPr lang="en-US"/>
           </a:p>
@@ -774,7 +773,7 @@
           <a:p>
             <a:fld id="{088A2421-D2CD-4522-A1BA-E4F59ED821B7}" type="datetime1">
               <a:rPr lang="en-US" smtClean="0"/>
-              <a:t>8/25/22</a:t>
+              <a:t>8/31/22</a:t>
             </a:fld>
             <a:endParaRPr lang="en-US"/>
           </a:p>
@@ -1049,7 +1048,7 @@
           <a:p>
             <a:fld id="{DA91928D-0C55-4D8D-9D16-4C05754E5356}" type="datetime1">
               <a:rPr lang="en-US" smtClean="0"/>
-              <a:t>8/25/22</a:t>
+              <a:t>8/31/22</a:t>
             </a:fld>
             <a:endParaRPr lang="en-US"/>
           </a:p>
@@ -1304,7 +1303,7 @@
           <a:p>
             <a:fld id="{584CEDDD-253B-4C38-A621-35D8BA950C17}" type="datetime1">
               <a:rPr lang="en-US" smtClean="0"/>
-              <a:t>8/25/22</a:t>
+              <a:t>8/31/22</a:t>
             </a:fld>
             <a:endParaRPr lang="en-US"/>
           </a:p>
@@ -1472,7 +1471,7 @@
           <a:p>
             <a:fld id="{BF0967E4-28CB-45C9-B82C-D6B22AD4F0EB}" type="datetime1">
               <a:rPr lang="en-US" smtClean="0"/>
-              <a:t>8/25/22</a:t>
+              <a:t>8/31/22</a:t>
             </a:fld>
             <a:endParaRPr lang="en-US"/>
           </a:p>
@@ -1650,7 +1649,7 @@
           <a:p>
             <a:fld id="{2454C693-B405-44E1-A127-B7CE8B45C1E1}" type="datetime1">
               <a:rPr lang="en-US" smtClean="0"/>
-              <a:t>8/25/22</a:t>
+              <a:t>8/31/22</a:t>
             </a:fld>
             <a:endParaRPr lang="en-US"/>
           </a:p>
@@ -1902,7 +1901,7 @@
           <a:p>
             <a:fld id="{26B28102-2E91-4DD7-8E8B-98B790A12701}" type="datetime1">
               <a:rPr lang="en-US" smtClean="0"/>
-              <a:t>8/25/22</a:t>
+              <a:t>8/31/22</a:t>
             </a:fld>
             <a:endParaRPr lang="en-US"/>
           </a:p>
@@ -2160,7 +2159,7 @@
           <a:p>
             <a:fld id="{0B5AF985-6D44-417A-9881-D208468CBA07}" type="datetime1">
               <a:rPr lang="en-US" smtClean="0"/>
-              <a:t>8/25/22</a:t>
+              <a:t>8/31/22</a:t>
             </a:fld>
             <a:endParaRPr lang="en-US"/>
           </a:p>
@@ -2417,7 +2416,7 @@
           <a:p>
             <a:fld id="{26B28102-2E91-4DD7-8E8B-98B790A12701}" type="datetime1">
               <a:rPr lang="en-US" smtClean="0"/>
-              <a:t>8/25/22</a:t>
+              <a:t>8/31/22</a:t>
             </a:fld>
             <a:endParaRPr lang="en-US"/>
           </a:p>
@@ -2663,7 +2662,7 @@
           <a:p>
             <a:fld id="{3A604A86-E8D2-4E57-8D6D-61E2D175474B}" type="datetime1">
               <a:rPr lang="en-US" smtClean="0"/>
-              <a:t>8/25/22</a:t>
+              <a:t>8/31/22</a:t>
             </a:fld>
             <a:endParaRPr lang="en-US"/>
           </a:p>
@@ -3026,7 +3025,7 @@
           <a:p>
             <a:fld id="{DC921DF3-1FB0-45DC-97EF-461960E13574}" type="datetime1">
               <a:rPr lang="en-US" smtClean="0"/>
-              <a:t>8/25/22</a:t>
+              <a:t>8/31/22</a:t>
             </a:fld>
             <a:endParaRPr lang="en-US"/>
           </a:p>
@@ -3518,7 +3517,7 @@
           <a:p>
             <a:fld id="{092B088E-2809-46D8-B43F-738015D878CC}" type="datetime1">
               <a:rPr lang="en-US" smtClean="0"/>
-              <a:t>8/25/22</a:t>
+              <a:t>8/31/22</a:t>
             </a:fld>
             <a:endParaRPr lang="en-US"/>
           </a:p>
@@ -3713,7 +3712,7 @@
           <a:p>
             <a:fld id="{8208D42A-BC08-426E-9E11-483BA9D61AF6}" type="datetime1">
               <a:rPr lang="en-US" smtClean="0"/>
-              <a:t>8/25/22</a:t>
+              <a:t>8/31/22</a:t>
             </a:fld>
             <a:endParaRPr lang="en-US"/>
           </a:p>
@@ -3913,7 +3912,7 @@
           <a:p>
             <a:fld id="{26B28102-2E91-4DD7-8E8B-98B790A12701}" type="datetime1">
               <a:rPr lang="en-US" smtClean="0"/>
-              <a:t>8/25/22</a:t>
+              <a:t>8/31/22</a:t>
             </a:fld>
             <a:endParaRPr lang="en-US"/>
           </a:p>
@@ -4009,7 +4008,7 @@
           <a:p>
             <a:fld id="{37D5C786-44E1-4BD5-AD14-75F3EA166B5A}" type="datetime1">
               <a:rPr lang="en-US" smtClean="0"/>
-              <a:t>8/25/22</a:t>
+              <a:t>8/31/22</a:t>
             </a:fld>
             <a:endParaRPr lang="en-US"/>
           </a:p>
@@ -4220,7 +4219,7 @@
           <a:p>
             <a:fld id="{26B28102-2E91-4DD7-8E8B-98B790A12701}" type="datetime1">
               <a:rPr lang="en-US" smtClean="0"/>
-              <a:t>8/25/22</a:t>
+              <a:t>8/31/22</a:t>
             </a:fld>
             <a:endParaRPr lang="en-US"/>
           </a:p>
@@ -7369,145 +7368,6 @@
       </p:grpSpPr>
       <p:sp>
         <p:nvSpPr>
-          <p:cNvPr id="36866" name="Rectangle 2"/>
-          <p:cNvSpPr>
-            <a:spLocks noGrp="1" noChangeArrowheads="1"/>
-          </p:cNvSpPr>
-          <p:nvPr>
-            <p:ph type="title"/>
-            <p:custDataLst>
-              <p:tags r:id="rId1"/>
-            </p:custDataLst>
-          </p:nvPr>
-        </p:nvSpPr>
-        <p:spPr/>
-        <p:txBody>
-          <a:bodyPr/>
-          <a:lstStyle/>
-          <a:p>
-            <a:r>
-              <a:rPr lang="en-US" dirty="0"/>
-              <a:t>depth-first search, example</a:t>
-            </a:r>
-          </a:p>
-        </p:txBody>
-      </p:sp>
-      <p:sp>
-        <p:nvSpPr>
-          <p:cNvPr id="5" name="Slide Number Placeholder 4"/>
-          <p:cNvSpPr>
-            <a:spLocks noGrp="1"/>
-          </p:cNvSpPr>
-          <p:nvPr>
-            <p:ph type="sldNum" sz="quarter" idx="12"/>
-          </p:nvPr>
-        </p:nvSpPr>
-        <p:spPr/>
-        <p:txBody>
-          <a:bodyPr/>
-          <a:lstStyle/>
-          <a:p>
-            <a:fld id="{030EE116-056E-4288-B7F7-411CB7E437A9}" type="slidenum">
-              <a:rPr lang="en-US" smtClean="0"/>
-              <a:pPr/>
-              <a:t>20</a:t>
-            </a:fld>
-            <a:endParaRPr lang="en-US"/>
-          </a:p>
-        </p:txBody>
-      </p:sp>
-      <p:sp>
-        <p:nvSpPr>
-          <p:cNvPr id="36867" name="Rectangle 3"/>
-          <p:cNvSpPr>
-            <a:spLocks noGrp="1" noChangeArrowheads="1"/>
-          </p:cNvSpPr>
-          <p:nvPr>
-            <p:ph sz="quarter" idx="1"/>
-            <p:custDataLst>
-              <p:tags r:id="rId2"/>
-            </p:custDataLst>
-          </p:nvPr>
-        </p:nvSpPr>
-        <p:spPr>
-          <a:xfrm>
-            <a:off x="1981200" y="1219200"/>
-            <a:ext cx="8229600" cy="609600"/>
-          </a:xfrm>
-        </p:spPr>
-        <p:txBody>
-          <a:bodyPr/>
-          <a:lstStyle/>
-          <a:p>
-            <a:r>
-              <a:rPr lang="en-US" dirty="0"/>
-              <a:t>Let’s start at V0</a:t>
-            </a:r>
-          </a:p>
-        </p:txBody>
-      </p:sp>
-      <p:pic>
-        <p:nvPicPr>
-          <p:cNvPr id="4" name="Picture 3">
-            <a:extLst>
-              <a:ext uri="{FF2B5EF4-FFF2-40B4-BE49-F238E27FC236}">
-                <a16:creationId xmlns:a16="http://schemas.microsoft.com/office/drawing/2014/main" id="{145AB879-32F5-DB4D-8EF0-D24F88DC4B9F}"/>
-              </a:ext>
-            </a:extLst>
-          </p:cNvPr>
-          <p:cNvPicPr>
-            <a:picLocks noChangeAspect="1"/>
-          </p:cNvPicPr>
-          <p:nvPr/>
-        </p:nvPicPr>
-        <p:blipFill>
-          <a:blip r:embed="rId4"/>
-          <a:stretch>
-            <a:fillRect/>
-          </a:stretch>
-        </p:blipFill>
-        <p:spPr>
-          <a:xfrm>
-            <a:off x="1828801" y="1797050"/>
-            <a:ext cx="3801831" cy="3689350"/>
-          </a:xfrm>
-          <a:prstGeom prst="rect">
-            <a:avLst/>
-          </a:prstGeom>
-        </p:spPr>
-      </p:pic>
-    </p:spTree>
-    <p:extLst>
-      <p:ext uri="{BB962C8B-B14F-4D97-AF65-F5344CB8AC3E}">
-        <p14:creationId xmlns:p14="http://schemas.microsoft.com/office/powerpoint/2010/main" val="731938050"/>
-      </p:ext>
-    </p:extLst>
-  </p:cSld>
-  <p:clrMapOvr>
-    <a:masterClrMapping/>
-  </p:clrMapOvr>
-</p:sld>
-</file>
-
-<file path=ppt/slides/slide21.xml><?xml version="1.0" encoding="utf-8"?>
-<p:sld xmlns:a="http://schemas.openxmlformats.org/drawingml/2006/main" xmlns:r="http://schemas.openxmlformats.org/officeDocument/2006/relationships" xmlns:p="http://schemas.openxmlformats.org/presentationml/2006/main">
-  <p:cSld>
-    <p:spTree>
-      <p:nvGrpSpPr>
-        <p:cNvPr id="1" name=""/>
-        <p:cNvGrpSpPr/>
-        <p:nvPr/>
-      </p:nvGrpSpPr>
-      <p:grpSpPr>
-        <a:xfrm>
-          <a:off x="0" y="0"/>
-          <a:ext cx="0" cy="0"/>
-          <a:chOff x="0" y="0"/>
-          <a:chExt cx="0" cy="0"/>
-        </a:xfrm>
-      </p:grpSpPr>
-      <p:sp>
-        <p:nvSpPr>
           <p:cNvPr id="46081" name="Title 1">
             <a:extLst>
               <a:ext uri="{FF2B5EF4-FFF2-40B4-BE49-F238E27FC236}">
@@ -7753,7 +7613,7 @@
 </p:sld>
 </file>
 
-<file path=ppt/slides/slide22.xml><?xml version="1.0" encoding="utf-8"?>
+<file path=ppt/slides/slide21.xml><?xml version="1.0" encoding="utf-8"?>
 <p:sld xmlns:a="http://schemas.openxmlformats.org/drawingml/2006/main" xmlns:r="http://schemas.openxmlformats.org/officeDocument/2006/relationships" xmlns:p="http://schemas.openxmlformats.org/presentationml/2006/main">
   <p:cSld>
     <p:spTree>
@@ -7970,7 +7830,7 @@
 </p:sld>
 </file>
 
-<file path=ppt/slides/slide23.xml><?xml version="1.0" encoding="utf-8"?>
+<file path=ppt/slides/slide22.xml><?xml version="1.0" encoding="utf-8"?>
 <p:sld xmlns:a="http://schemas.openxmlformats.org/drawingml/2006/main" xmlns:r="http://schemas.openxmlformats.org/officeDocument/2006/relationships" xmlns:p="http://schemas.openxmlformats.org/presentationml/2006/main">
   <p:cSld>
     <p:spTree>
@@ -8187,6 +8047,110 @@
 </p:sld>
 </file>
 
+<file path=ppt/slides/slide23.xml><?xml version="1.0" encoding="utf-8"?>
+<p:sld xmlns:a="http://schemas.openxmlformats.org/drawingml/2006/main" xmlns:r="http://schemas.openxmlformats.org/officeDocument/2006/relationships" xmlns:p="http://schemas.openxmlformats.org/presentationml/2006/main">
+  <p:cSld>
+    <p:spTree>
+      <p:nvGrpSpPr>
+        <p:cNvPr id="1" name=""/>
+        <p:cNvGrpSpPr/>
+        <p:nvPr/>
+      </p:nvGrpSpPr>
+      <p:grpSpPr>
+        <a:xfrm>
+          <a:off x="0" y="0"/>
+          <a:ext cx="0" cy="0"/>
+          <a:chOff x="0" y="0"/>
+          <a:chExt cx="0" cy="0"/>
+        </a:xfrm>
+      </p:grpSpPr>
+      <p:sp>
+        <p:nvSpPr>
+          <p:cNvPr id="2" name="Title 1"/>
+          <p:cNvSpPr>
+            <a:spLocks noGrp="1"/>
+          </p:cNvSpPr>
+          <p:nvPr>
+            <p:ph type="ctrTitle"/>
+          </p:nvPr>
+        </p:nvSpPr>
+        <p:spPr/>
+        <p:txBody>
+          <a:bodyPr>
+            <a:normAutofit/>
+          </a:bodyPr>
+          <a:lstStyle/>
+          <a:p>
+            <a:r>
+              <a:rPr lang="en-US" dirty="0"/>
+              <a:t>Topological Sorting</a:t>
+            </a:r>
+          </a:p>
+        </p:txBody>
+      </p:sp>
+      <p:sp>
+        <p:nvSpPr>
+          <p:cNvPr id="3" name="Subtitle 2"/>
+          <p:cNvSpPr>
+            <a:spLocks noGrp="1"/>
+          </p:cNvSpPr>
+          <p:nvPr>
+            <p:ph type="subTitle" idx="1"/>
+          </p:nvPr>
+        </p:nvSpPr>
+        <p:spPr/>
+        <p:txBody>
+          <a:bodyPr/>
+          <a:lstStyle/>
+          <a:p>
+            <a:r>
+              <a:rPr lang="en-US" dirty="0"/>
+              <a:t>Readings:  CLRS 22.4</a:t>
+            </a:r>
+          </a:p>
+        </p:txBody>
+      </p:sp>
+      <p:sp>
+        <p:nvSpPr>
+          <p:cNvPr id="4" name="Slide Number Placeholder 3"/>
+          <p:cNvSpPr>
+            <a:spLocks noGrp="1"/>
+          </p:cNvSpPr>
+          <p:nvPr>
+            <p:ph type="sldNum" sz="quarter" idx="12"/>
+          </p:nvPr>
+        </p:nvSpPr>
+        <p:spPr>
+          <a:prstGeom prst="rect">
+            <a:avLst/>
+          </a:prstGeom>
+        </p:spPr>
+        <p:txBody>
+          <a:bodyPr/>
+          <a:lstStyle/>
+          <a:p>
+            <a:fld id="{DACC1BBE-66B1-403A-8C7E-C57A0F3A107F}" type="slidenum">
+              <a:rPr lang="en-US" smtClean="0"/>
+              <a:pPr/>
+              <a:t>23</a:t>
+            </a:fld>
+            <a:endParaRPr lang="en-US"/>
+          </a:p>
+        </p:txBody>
+      </p:sp>
+    </p:spTree>
+    <p:extLst>
+      <p:ext uri="{BB962C8B-B14F-4D97-AF65-F5344CB8AC3E}">
+        <p14:creationId xmlns:p14="http://schemas.microsoft.com/office/powerpoint/2010/main" val="1571932749"/>
+      </p:ext>
+    </p:extLst>
+  </p:cSld>
+  <p:clrMapOvr>
+    <a:masterClrMapping/>
+  </p:clrMapOvr>
+</p:sld>
+</file>
+
 <file path=ppt/slides/slide24.xml><?xml version="1.0" encoding="utf-8"?>
 <p:sld xmlns:a="http://schemas.openxmlformats.org/drawingml/2006/main" xmlns:r="http://schemas.openxmlformats.org/officeDocument/2006/relationships" xmlns:p="http://schemas.openxmlformats.org/presentationml/2006/main">
   <p:cSld>
@@ -8206,36 +8170,12 @@
       </p:grpSpPr>
       <p:sp>
         <p:nvSpPr>
-          <p:cNvPr id="2" name="Title 1"/>
+          <p:cNvPr id="35842" name="Title 1"/>
           <p:cNvSpPr>
             <a:spLocks noGrp="1"/>
           </p:cNvSpPr>
           <p:nvPr>
-            <p:ph type="ctrTitle"/>
-          </p:nvPr>
-        </p:nvSpPr>
-        <p:spPr/>
-        <p:txBody>
-          <a:bodyPr>
-            <a:normAutofit/>
-          </a:bodyPr>
-          <a:lstStyle/>
-          <a:p>
-            <a:r>
-              <a:rPr lang="en-US" dirty="0"/>
-              <a:t>Topological Sorting</a:t>
-            </a:r>
-          </a:p>
-        </p:txBody>
-      </p:sp>
-      <p:sp>
-        <p:nvSpPr>
-          <p:cNvPr id="3" name="Subtitle 2"/>
-          <p:cNvSpPr>
-            <a:spLocks noGrp="1"/>
-          </p:cNvSpPr>
-          <p:nvPr>
-            <p:ph type="subTitle" idx="1"/>
+            <p:ph type="title"/>
           </p:nvPr>
         </p:nvSpPr>
         <p:spPr/>
@@ -8245,7 +8185,7 @@
           <a:p>
             <a:r>
               <a:rPr lang="en-US" dirty="0"/>
-              <a:t>Readings:  CLRS 22.4</a:t>
+              <a:t>Topological Sort</a:t>
             </a:r>
           </a:p>
         </p:txBody>
@@ -8260,11 +8200,7 @@
             <p:ph type="sldNum" sz="quarter" idx="12"/>
           </p:nvPr>
         </p:nvSpPr>
-        <p:spPr>
-          <a:prstGeom prst="rect">
-            <a:avLst/>
-          </a:prstGeom>
-        </p:spPr>
+        <p:spPr/>
         <p:txBody>
           <a:bodyPr/>
           <a:lstStyle/>
@@ -8273,82 +8209,6 @@
               <a:rPr lang="en-US" smtClean="0"/>
               <a:pPr/>
               <a:t>24</a:t>
-            </a:fld>
-            <a:endParaRPr lang="en-US"/>
-          </a:p>
-        </p:txBody>
-      </p:sp>
-    </p:spTree>
-    <p:extLst>
-      <p:ext uri="{BB962C8B-B14F-4D97-AF65-F5344CB8AC3E}">
-        <p14:creationId xmlns:p14="http://schemas.microsoft.com/office/powerpoint/2010/main" val="1571932749"/>
-      </p:ext>
-    </p:extLst>
-  </p:cSld>
-  <p:clrMapOvr>
-    <a:masterClrMapping/>
-  </p:clrMapOvr>
-</p:sld>
-</file>
-
-<file path=ppt/slides/slide25.xml><?xml version="1.0" encoding="utf-8"?>
-<p:sld xmlns:a="http://schemas.openxmlformats.org/drawingml/2006/main" xmlns:r="http://schemas.openxmlformats.org/officeDocument/2006/relationships" xmlns:p="http://schemas.openxmlformats.org/presentationml/2006/main">
-  <p:cSld>
-    <p:spTree>
-      <p:nvGrpSpPr>
-        <p:cNvPr id="1" name=""/>
-        <p:cNvGrpSpPr/>
-        <p:nvPr/>
-      </p:nvGrpSpPr>
-      <p:grpSpPr>
-        <a:xfrm>
-          <a:off x="0" y="0"/>
-          <a:ext cx="0" cy="0"/>
-          <a:chOff x="0" y="0"/>
-          <a:chExt cx="0" cy="0"/>
-        </a:xfrm>
-      </p:grpSpPr>
-      <p:sp>
-        <p:nvSpPr>
-          <p:cNvPr id="35842" name="Title 1"/>
-          <p:cNvSpPr>
-            <a:spLocks noGrp="1"/>
-          </p:cNvSpPr>
-          <p:nvPr>
-            <p:ph type="title"/>
-          </p:nvPr>
-        </p:nvSpPr>
-        <p:spPr/>
-        <p:txBody>
-          <a:bodyPr/>
-          <a:lstStyle/>
-          <a:p>
-            <a:r>
-              <a:rPr lang="en-US" dirty="0"/>
-              <a:t>Topological Sort</a:t>
-            </a:r>
-          </a:p>
-        </p:txBody>
-      </p:sp>
-      <p:sp>
-        <p:nvSpPr>
-          <p:cNvPr id="4" name="Slide Number Placeholder 3"/>
-          <p:cNvSpPr>
-            <a:spLocks noGrp="1"/>
-          </p:cNvSpPr>
-          <p:nvPr>
-            <p:ph type="sldNum" sz="quarter" idx="12"/>
-          </p:nvPr>
-        </p:nvSpPr>
-        <p:spPr/>
-        <p:txBody>
-          <a:bodyPr/>
-          <a:lstStyle/>
-          <a:p>
-            <a:fld id="{DACC1BBE-66B1-403A-8C7E-C57A0F3A107F}" type="slidenum">
-              <a:rPr lang="en-US" smtClean="0"/>
-              <a:pPr/>
-              <a:t>25</a:t>
             </a:fld>
             <a:endParaRPr lang="en-US"/>
           </a:p>
@@ -8654,7 +8514,7 @@
 </p:sld>
 </file>
 
-<file path=ppt/slides/slide26.xml><?xml version="1.0" encoding="utf-8"?>
+<file path=ppt/slides/slide25.xml><?xml version="1.0" encoding="utf-8"?>
 <p:sld xmlns:a="http://schemas.openxmlformats.org/drawingml/2006/main" xmlns:r="http://schemas.openxmlformats.org/officeDocument/2006/relationships" xmlns:p="http://schemas.openxmlformats.org/presentationml/2006/main">
   <p:cSld>
     <p:spTree>
@@ -8711,7 +8571,7 @@
             <a:fld id="{DACC1BBE-66B1-403A-8C7E-C57A0F3A107F}" type="slidenum">
               <a:rPr lang="en-US" smtClean="0"/>
               <a:pPr/>
-              <a:t>26</a:t>
+              <a:t>25</a:t>
             </a:fld>
             <a:endParaRPr lang="en-US"/>
           </a:p>
@@ -8806,7 +8666,7 @@
 </p:sld>
 </file>
 
-<file path=ppt/slides/slide27.xml><?xml version="1.0" encoding="utf-8"?>
+<file path=ppt/slides/slide26.xml><?xml version="1.0" encoding="utf-8"?>
 <p:sld xmlns:a="http://schemas.openxmlformats.org/drawingml/2006/main" xmlns:r="http://schemas.openxmlformats.org/officeDocument/2006/relationships" xmlns:p="http://schemas.openxmlformats.org/presentationml/2006/main">
   <p:cSld>
     <p:spTree>
@@ -10722,7 +10582,7 @@
 </p:sld>
 </file>
 
-<file path=ppt/slides/slide28.xml><?xml version="1.0" encoding="utf-8"?>
+<file path=ppt/slides/slide27.xml><?xml version="1.0" encoding="utf-8"?>
 <p:sld xmlns:a="http://schemas.openxmlformats.org/drawingml/2006/main" xmlns:r="http://schemas.openxmlformats.org/officeDocument/2006/relationships" xmlns:p="http://schemas.openxmlformats.org/presentationml/2006/main">
   <p:cSld>
     <p:spTree>
@@ -11168,6 +11028,381 @@
 </p:sld>
 </file>
 
+<file path=ppt/slides/slide28.xml><?xml version="1.0" encoding="utf-8"?>
+<p:sld xmlns:a="http://schemas.openxmlformats.org/drawingml/2006/main" xmlns:r="http://schemas.openxmlformats.org/officeDocument/2006/relationships" xmlns:p="http://schemas.openxmlformats.org/presentationml/2006/main">
+  <p:cSld>
+    <p:spTree>
+      <p:nvGrpSpPr>
+        <p:cNvPr id="1" name=""/>
+        <p:cNvGrpSpPr/>
+        <p:nvPr/>
+      </p:nvGrpSpPr>
+      <p:grpSpPr>
+        <a:xfrm>
+          <a:off x="0" y="0"/>
+          <a:ext cx="0" cy="0"/>
+          <a:chOff x="0" y="0"/>
+          <a:chExt cx="0" cy="0"/>
+        </a:xfrm>
+      </p:grpSpPr>
+      <p:sp>
+        <p:nvSpPr>
+          <p:cNvPr id="61441" name="Title 1">
+            <a:extLst>
+              <a:ext uri="{FF2B5EF4-FFF2-40B4-BE49-F238E27FC236}">
+                <a16:creationId xmlns:a16="http://schemas.microsoft.com/office/drawing/2014/main" id="{8BDFA3EE-B247-9B45-A6CA-B8E3E36A8E98}"/>
+              </a:ext>
+            </a:extLst>
+          </p:cNvPr>
+          <p:cNvSpPr>
+            <a:spLocks noGrp="1"/>
+          </p:cNvSpPr>
+          <p:nvPr>
+            <p:ph type="title"/>
+          </p:nvPr>
+        </p:nvSpPr>
+        <p:spPr>
+          <a:xfrm>
+            <a:off x="1981200" y="228601"/>
+            <a:ext cx="8229600" cy="631825"/>
+          </a:xfrm>
+        </p:spPr>
+        <p:txBody>
+          <a:bodyPr>
+            <a:normAutofit fontScale="90000"/>
+          </a:bodyPr>
+          <a:lstStyle/>
+          <a:p>
+            <a:r>
+              <a:rPr lang="en-US" altLang="en-US">
+                <a:latin typeface="Calibri" panose="020F0502020204030204" pitchFamily="34" charset="0"/>
+                <a:ea typeface="ＭＳ Ｐゴシック" panose="020B0600070205080204" pitchFamily="34" charset="-128"/>
+              </a:rPr>
+              <a:t>Topological Sort Algorithm</a:t>
+            </a:r>
+          </a:p>
+        </p:txBody>
+      </p:sp>
+      <p:sp>
+        <p:nvSpPr>
+          <p:cNvPr id="20483" name="TextBox 3">
+            <a:extLst>
+              <a:ext uri="{FF2B5EF4-FFF2-40B4-BE49-F238E27FC236}">
+                <a16:creationId xmlns:a16="http://schemas.microsoft.com/office/drawing/2014/main" id="{124A69D0-A687-F446-8F66-D388A097E1FA}"/>
+              </a:ext>
+            </a:extLst>
+          </p:cNvPr>
+          <p:cNvSpPr txBox="1">
+            <a:spLocks noChangeArrowheads="1"/>
+          </p:cNvSpPr>
+          <p:nvPr/>
+        </p:nvSpPr>
+        <p:spPr bwMode="auto">
+          <a:xfrm>
+            <a:off x="2362201" y="2438400"/>
+            <a:ext cx="5535811" cy="3785652"/>
+          </a:xfrm>
+          <a:prstGeom prst="rect">
+            <a:avLst/>
+          </a:prstGeom>
+          <a:noFill/>
+          <a:ln>
+            <a:noFill/>
+          </a:ln>
+          <a:extLst>
+            <a:ext uri="{909E8E84-426E-40dd-AFC4-6F175D3DCCD1}">
+              <a14:hiddenFill xmlns="" xmlns:a14="http://schemas.microsoft.com/office/drawing/2010/main">
+                <a:solidFill>
+                  <a:srgbClr val="FFFFFF"/>
+                </a:solidFill>
+              </a14:hiddenFill>
+            </a:ext>
+            <a:ext uri="{91240B29-F687-4f45-9708-019B960494DF}">
+              <a14:hiddenLine xmlns="" xmlns:a14="http://schemas.microsoft.com/office/drawing/2010/main" w="9525">
+                <a:solidFill>
+                  <a:srgbClr val="000000"/>
+                </a:solidFill>
+                <a:miter lim="800000"/>
+                <a:headEnd/>
+                <a:tailEnd/>
+              </a14:hiddenLine>
+            </a:ext>
+          </a:extLst>
+        </p:spPr>
+        <p:txBody>
+          <a:bodyPr wrap="none">
+            <a:spAutoFit/>
+          </a:bodyPr>
+          <a:lstStyle>
+            <a:lvl1pPr>
+              <a:defRPr sz="2400">
+                <a:solidFill>
+                  <a:schemeClr val="tx1"/>
+                </a:solidFill>
+                <a:latin typeface="Times New Roman" panose="02020603050405020304" pitchFamily="18" charset="0"/>
+                <a:ea typeface="ＭＳ Ｐゴシック" panose="020B0600070205080204" pitchFamily="34" charset="-128"/>
+              </a:defRPr>
+            </a:lvl1pPr>
+            <a:lvl2pPr marL="742950" indent="-285750">
+              <a:defRPr sz="2400">
+                <a:solidFill>
+                  <a:schemeClr val="tx1"/>
+                </a:solidFill>
+                <a:latin typeface="Times New Roman" panose="02020603050405020304" pitchFamily="18" charset="0"/>
+                <a:ea typeface="ＭＳ Ｐゴシック" panose="020B0600070205080204" pitchFamily="34" charset="-128"/>
+              </a:defRPr>
+            </a:lvl2pPr>
+            <a:lvl3pPr marL="1143000" indent="-228600">
+              <a:defRPr sz="2400">
+                <a:solidFill>
+                  <a:schemeClr val="tx1"/>
+                </a:solidFill>
+                <a:latin typeface="Times New Roman" panose="02020603050405020304" pitchFamily="18" charset="0"/>
+                <a:ea typeface="ＭＳ Ｐゴシック" panose="020B0600070205080204" pitchFamily="34" charset="-128"/>
+              </a:defRPr>
+            </a:lvl3pPr>
+            <a:lvl4pPr marL="1600200" indent="-228600">
+              <a:defRPr sz="2400">
+                <a:solidFill>
+                  <a:schemeClr val="tx1"/>
+                </a:solidFill>
+                <a:latin typeface="Times New Roman" panose="02020603050405020304" pitchFamily="18" charset="0"/>
+                <a:ea typeface="ＭＳ Ｐゴシック" panose="020B0600070205080204" pitchFamily="34" charset="-128"/>
+              </a:defRPr>
+            </a:lvl4pPr>
+            <a:lvl5pPr marL="2057400" indent="-228600">
+              <a:defRPr sz="2400">
+                <a:solidFill>
+                  <a:schemeClr val="tx1"/>
+                </a:solidFill>
+                <a:latin typeface="Times New Roman" panose="02020603050405020304" pitchFamily="18" charset="0"/>
+                <a:ea typeface="ＭＳ Ｐゴシック" panose="020B0600070205080204" pitchFamily="34" charset="-128"/>
+              </a:defRPr>
+            </a:lvl5pPr>
+            <a:lvl6pPr marL="2514600" indent="-228600" eaLnBrk="0" fontAlgn="base" hangingPunct="0">
+              <a:spcBef>
+                <a:spcPct val="0"/>
+              </a:spcBef>
+              <a:spcAft>
+                <a:spcPct val="0"/>
+              </a:spcAft>
+              <a:defRPr sz="2400">
+                <a:solidFill>
+                  <a:schemeClr val="tx1"/>
+                </a:solidFill>
+                <a:latin typeface="Times New Roman" panose="02020603050405020304" pitchFamily="18" charset="0"/>
+                <a:ea typeface="ＭＳ Ｐゴシック" panose="020B0600070205080204" pitchFamily="34" charset="-128"/>
+              </a:defRPr>
+            </a:lvl6pPr>
+            <a:lvl7pPr marL="2971800" indent="-228600" eaLnBrk="0" fontAlgn="base" hangingPunct="0">
+              <a:spcBef>
+                <a:spcPct val="0"/>
+              </a:spcBef>
+              <a:spcAft>
+                <a:spcPct val="0"/>
+              </a:spcAft>
+              <a:defRPr sz="2400">
+                <a:solidFill>
+                  <a:schemeClr val="tx1"/>
+                </a:solidFill>
+                <a:latin typeface="Times New Roman" panose="02020603050405020304" pitchFamily="18" charset="0"/>
+                <a:ea typeface="ＭＳ Ｐゴシック" panose="020B0600070205080204" pitchFamily="34" charset="-128"/>
+              </a:defRPr>
+            </a:lvl7pPr>
+            <a:lvl8pPr marL="3429000" indent="-228600" eaLnBrk="0" fontAlgn="base" hangingPunct="0">
+              <a:spcBef>
+                <a:spcPct val="0"/>
+              </a:spcBef>
+              <a:spcAft>
+                <a:spcPct val="0"/>
+              </a:spcAft>
+              <a:defRPr sz="2400">
+                <a:solidFill>
+                  <a:schemeClr val="tx1"/>
+                </a:solidFill>
+                <a:latin typeface="Times New Roman" panose="02020603050405020304" pitchFamily="18" charset="0"/>
+                <a:ea typeface="ＭＳ Ｐゴシック" panose="020B0600070205080204" pitchFamily="34" charset="-128"/>
+              </a:defRPr>
+            </a:lvl8pPr>
+            <a:lvl9pPr marL="3886200" indent="-228600" eaLnBrk="0" fontAlgn="base" hangingPunct="0">
+              <a:spcBef>
+                <a:spcPct val="0"/>
+              </a:spcBef>
+              <a:spcAft>
+                <a:spcPct val="0"/>
+              </a:spcAft>
+              <a:defRPr sz="2400">
+                <a:solidFill>
+                  <a:schemeClr val="tx1"/>
+                </a:solidFill>
+                <a:latin typeface="Times New Roman" panose="02020603050405020304" pitchFamily="18" charset="0"/>
+                <a:ea typeface="ＭＳ Ｐゴシック" panose="020B0600070205080204" pitchFamily="34" charset="-128"/>
+              </a:defRPr>
+            </a:lvl9pPr>
+          </a:lstStyle>
+          <a:p>
+            <a:r>
+              <a:rPr lang="en-US" altLang="en-US">
+                <a:latin typeface="Calibri" panose="020F0502020204030204" pitchFamily="34" charset="0"/>
+              </a:rPr>
+              <a:t>DFS(G)</a:t>
+            </a:r>
+          </a:p>
+          <a:p>
+            <a:r>
+              <a:rPr lang="en-US" altLang="en-US">
+                <a:solidFill>
+                  <a:srgbClr val="FF0000"/>
+                </a:solidFill>
+                <a:latin typeface="Calibri" panose="020F0502020204030204" pitchFamily="34" charset="0"/>
+              </a:rPr>
+              <a:t>0 toposort-list = [ ] // empty list</a:t>
+            </a:r>
+            <a:endParaRPr lang="en-US" altLang="en-US">
+              <a:latin typeface="Calibri" panose="020F0502020204030204" pitchFamily="34" charset="0"/>
+            </a:endParaRPr>
+          </a:p>
+          <a:p>
+            <a:r>
+              <a:rPr lang="en-US" altLang="en-US">
+                <a:latin typeface="Calibri" panose="020F0502020204030204" pitchFamily="34" charset="0"/>
+              </a:rPr>
+              <a:t>1 for each vertex u in G.V</a:t>
+            </a:r>
+          </a:p>
+          <a:p>
+            <a:r>
+              <a:rPr lang="en-US" altLang="en-US">
+                <a:latin typeface="Calibri" panose="020F0502020204030204" pitchFamily="34" charset="0"/>
+              </a:rPr>
+              <a:t>2       u.color = WHITE</a:t>
+            </a:r>
+          </a:p>
+          <a:p>
+            <a:r>
+              <a:rPr lang="en-US" altLang="en-US">
+                <a:latin typeface="Calibri" panose="020F0502020204030204" pitchFamily="34" charset="0"/>
+              </a:rPr>
+              <a:t>3       u.</a:t>
+            </a:r>
+            <a:r>
+              <a:rPr lang="el-GR" altLang="en-US">
+                <a:latin typeface="Calibri" panose="020F0502020204030204" pitchFamily="34" charset="0"/>
+              </a:rPr>
+              <a:t>π</a:t>
+            </a:r>
+            <a:r>
+              <a:rPr lang="en-US" altLang="en-US">
+                <a:latin typeface="Calibri" panose="020F0502020204030204" pitchFamily="34" charset="0"/>
+              </a:rPr>
+              <a:t> = NIL</a:t>
+            </a:r>
+          </a:p>
+          <a:p>
+            <a:r>
+              <a:rPr lang="en-US" altLang="en-US">
+                <a:latin typeface="Calibri" panose="020F0502020204030204" pitchFamily="34" charset="0"/>
+              </a:rPr>
+              <a:t>4 time = 0</a:t>
+            </a:r>
+          </a:p>
+          <a:p>
+            <a:r>
+              <a:rPr lang="en-US" altLang="en-US">
+                <a:latin typeface="Calibri" panose="020F0502020204030204" pitchFamily="34" charset="0"/>
+              </a:rPr>
+              <a:t>5 for each vertex u in G.V</a:t>
+            </a:r>
+          </a:p>
+          <a:p>
+            <a:r>
+              <a:rPr lang="en-US" altLang="en-US">
+                <a:latin typeface="Calibri" panose="020F0502020204030204" pitchFamily="34" charset="0"/>
+              </a:rPr>
+              <a:t>6       if u.color == WHITE  // if unseen</a:t>
+            </a:r>
+          </a:p>
+          <a:p>
+            <a:pPr>
+              <a:buFontTx/>
+              <a:buAutoNum type="arabicPlain" startAt="7"/>
+            </a:pPr>
+            <a:r>
+              <a:rPr lang="en-US" altLang="en-US">
+                <a:latin typeface="Calibri" panose="020F0502020204030204" pitchFamily="34" charset="0"/>
+              </a:rPr>
+              <a:t>  DFS-VISIT(G, u)  // explore paths out of u</a:t>
+            </a:r>
+          </a:p>
+          <a:p>
+            <a:r>
+              <a:rPr lang="en-US" altLang="en-US">
+                <a:solidFill>
+                  <a:srgbClr val="FF0000"/>
+                </a:solidFill>
+                <a:latin typeface="Calibri" panose="020F0502020204030204" pitchFamily="34" charset="0"/>
+              </a:rPr>
+              <a:t>8 // toposort-list contains the result</a:t>
+            </a:r>
+          </a:p>
+        </p:txBody>
+      </p:sp>
+      <p:sp>
+        <p:nvSpPr>
+          <p:cNvPr id="2" name="TextBox 1">
+            <a:extLst>
+              <a:ext uri="{FF2B5EF4-FFF2-40B4-BE49-F238E27FC236}">
+                <a16:creationId xmlns:a16="http://schemas.microsoft.com/office/drawing/2014/main" id="{379BFD4C-D4C1-F048-8047-8BF1A1C1ED58}"/>
+              </a:ext>
+            </a:extLst>
+          </p:cNvPr>
+          <p:cNvSpPr txBox="1"/>
+          <p:nvPr/>
+        </p:nvSpPr>
+        <p:spPr>
+          <a:xfrm>
+            <a:off x="990600" y="1447801"/>
+            <a:ext cx="8763000" cy="830997"/>
+          </a:xfrm>
+          <a:prstGeom prst="rect">
+            <a:avLst/>
+          </a:prstGeom>
+          <a:noFill/>
+        </p:spPr>
+        <p:txBody>
+          <a:bodyPr wrap="square">
+            <a:spAutoFit/>
+          </a:bodyPr>
+          <a:lstStyle/>
+          <a:p>
+            <a:pPr marL="342900" indent="-342900">
+              <a:buFont typeface="Arial"/>
+              <a:buChar char="•"/>
+              <a:defRPr/>
+            </a:pPr>
+            <a:r>
+              <a:rPr lang="en-US" sz="2400" dirty="0">
+                <a:ea typeface="ＭＳ Ｐゴシック" charset="0"/>
+                <a:cs typeface="ＭＳ Ｐゴシック" charset="0"/>
+              </a:rPr>
+              <a:t>Strategy: modify the two DFS functions so that they order nodes by finish-time in reverse order.  This slide:  DFS “Sweep”.</a:t>
+            </a:r>
+          </a:p>
+        </p:txBody>
+      </p:sp>
+    </p:spTree>
+    <p:extLst>
+      <p:ext uri="{BB962C8B-B14F-4D97-AF65-F5344CB8AC3E}">
+        <p14:creationId xmlns:p14="http://schemas.microsoft.com/office/powerpoint/2010/main" val="2788001959"/>
+      </p:ext>
+    </p:extLst>
+  </p:cSld>
+  <p:clrMapOvr>
+    <a:masterClrMapping/>
+  </p:clrMapOvr>
+</p:sld>
+</file>
+
 <file path=ppt/slides/slide29.xml><?xml version="1.0" encoding="utf-8"?>
 <p:sld xmlns:a="http://schemas.openxmlformats.org/drawingml/2006/main" xmlns:r="http://schemas.openxmlformats.org/officeDocument/2006/relationships" xmlns:p="http://schemas.openxmlformats.org/presentationml/2006/main">
   <p:cSld>
@@ -11187,10 +11422,10 @@
       </p:grpSpPr>
       <p:sp>
         <p:nvSpPr>
-          <p:cNvPr id="61441" name="Title 1">
+          <p:cNvPr id="62465" name="Title 1">
             <a:extLst>
               <a:ext uri="{FF2B5EF4-FFF2-40B4-BE49-F238E27FC236}">
-                <a16:creationId xmlns:a16="http://schemas.microsoft.com/office/drawing/2014/main" id="{8BDFA3EE-B247-9B45-A6CA-B8E3E36A8E98}"/>
+                <a16:creationId xmlns:a16="http://schemas.microsoft.com/office/drawing/2014/main" id="{5BEDDCEA-AA79-9C43-BAEF-F779F7FC8923}"/>
               </a:ext>
             </a:extLst>
           </p:cNvPr>
@@ -11225,10 +11460,10 @@
       </p:sp>
       <p:sp>
         <p:nvSpPr>
-          <p:cNvPr id="20483" name="TextBox 3">
+          <p:cNvPr id="62466" name="TextBox 3">
             <a:extLst>
               <a:ext uri="{FF2B5EF4-FFF2-40B4-BE49-F238E27FC236}">
-                <a16:creationId xmlns:a16="http://schemas.microsoft.com/office/drawing/2014/main" id="{124A69D0-A687-F446-8F66-D388A097E1FA}"/>
+                <a16:creationId xmlns:a16="http://schemas.microsoft.com/office/drawing/2014/main" id="{8FCA770D-B9F0-5F45-A684-BEF101128CDF}"/>
               </a:ext>
             </a:extLst>
           </p:cNvPr>
@@ -11239,8 +11474,8 @@
         </p:nvSpPr>
         <p:spPr bwMode="auto">
           <a:xfrm>
-            <a:off x="2362201" y="2438400"/>
-            <a:ext cx="5535811" cy="3785652"/>
+            <a:off x="1711325" y="1524000"/>
+            <a:ext cx="8499475" cy="4524375"/>
           </a:xfrm>
           <a:prstGeom prst="rect">
             <a:avLst/>
@@ -11250,15 +11485,15 @@
             <a:noFill/>
           </a:ln>
           <a:extLst>
-            <a:ext uri="{909E8E84-426E-40dd-AFC4-6F175D3DCCD1}">
-              <a14:hiddenFill xmlns:a14="http://schemas.microsoft.com/office/drawing/2010/main" xmlns="">
+            <a:ext uri="{909E8E84-426E-40DD-AFC4-6F175D3DCCD1}">
+              <a14:hiddenFill xmlns:a14="http://schemas.microsoft.com/office/drawing/2010/main">
                 <a:solidFill>
                   <a:srgbClr val="FFFFFF"/>
                 </a:solidFill>
               </a14:hiddenFill>
             </a:ext>
-            <a:ext uri="{91240B29-F687-4f45-9708-019B960494DF}">
-              <a14:hiddenLine xmlns:a14="http://schemas.microsoft.com/office/drawing/2010/main" xmlns="" w="9525">
+            <a:ext uri="{91240B29-F687-4F45-9708-019B960494DF}">
+              <a14:hiddenLine xmlns:a14="http://schemas.microsoft.com/office/drawing/2010/main" w="9525">
                 <a:solidFill>
                   <a:srgbClr val="000000"/>
                 </a:solidFill>
@@ -11382,150 +11617,227 @@
           </a:lstStyle>
           <a:p>
             <a:r>
-              <a:rPr lang="en-US" altLang="en-US">
+              <a:rPr lang="en-US" altLang="en-US" dirty="0">
                 <a:latin typeface="Calibri" panose="020F0502020204030204" pitchFamily="34" charset="0"/>
               </a:rPr>
-              <a:t>DFS(G)</a:t>
-            </a:r>
-          </a:p>
-          <a:p>
-            <a:r>
-              <a:rPr lang="en-US" altLang="en-US">
-                <a:solidFill>
-                  <a:srgbClr val="FF0000"/>
-                </a:solidFill>
+              <a:t>DFS-VISIT(G, u)</a:t>
+            </a:r>
+          </a:p>
+          <a:p>
+            <a:r>
+              <a:rPr lang="en-US" altLang="en-US" dirty="0">
                 <a:latin typeface="Calibri" panose="020F0502020204030204" pitchFamily="34" charset="0"/>
               </a:rPr>
-              <a:t>0 toposort-list = [ ] // empty list</a:t>
-            </a:r>
-            <a:endParaRPr lang="en-US" altLang="en-US">
-              <a:latin typeface="Calibri" panose="020F0502020204030204" pitchFamily="34" charset="0"/>
-            </a:endParaRPr>
-          </a:p>
-          <a:p>
-            <a:r>
-              <a:rPr lang="en-US" altLang="en-US">
+              <a:t>1   time = time + 1  // white vertex u has just been discovered</a:t>
+            </a:r>
+          </a:p>
+          <a:p>
+            <a:r>
+              <a:rPr lang="en-US" altLang="en-US" dirty="0">
                 <a:latin typeface="Calibri" panose="020F0502020204030204" pitchFamily="34" charset="0"/>
               </a:rPr>
-              <a:t>1 for each vertex u in G.V</a:t>
-            </a:r>
-          </a:p>
-          <a:p>
-            <a:r>
-              <a:rPr lang="en-US" altLang="en-US">
+              <a:t>2   </a:t>
+            </a:r>
+            <a:r>
+              <a:rPr lang="en-US" altLang="en-US" dirty="0" err="1">
                 <a:latin typeface="Calibri" panose="020F0502020204030204" pitchFamily="34" charset="0"/>
               </a:rPr>
-              <a:t>2       u.color = WHITE</a:t>
-            </a:r>
-          </a:p>
-          <a:p>
-            <a:r>
-              <a:rPr lang="en-US" altLang="en-US">
+              <a:t>u.d</a:t>
+            </a:r>
+            <a:r>
+              <a:rPr lang="en-US" altLang="en-US" dirty="0">
                 <a:latin typeface="Calibri" panose="020F0502020204030204" pitchFamily="34" charset="0"/>
               </a:rPr>
-              <a:t>3       u.</a:t>
-            </a:r>
-            <a:r>
-              <a:rPr lang="el-GR" altLang="en-US">
+              <a:t> = time  // discovery time of u</a:t>
+            </a:r>
+          </a:p>
+          <a:p>
+            <a:r>
+              <a:rPr lang="en-US" altLang="en-US" dirty="0">
+                <a:latin typeface="Calibri" panose="020F0502020204030204" pitchFamily="34" charset="0"/>
+              </a:rPr>
+              <a:t>3   </a:t>
+            </a:r>
+            <a:r>
+              <a:rPr lang="en-US" altLang="en-US" dirty="0" err="1">
+                <a:latin typeface="Calibri" panose="020F0502020204030204" pitchFamily="34" charset="0"/>
+              </a:rPr>
+              <a:t>u.color</a:t>
+            </a:r>
+            <a:r>
+              <a:rPr lang="en-US" altLang="en-US" dirty="0">
+                <a:latin typeface="Calibri" panose="020F0502020204030204" pitchFamily="34" charset="0"/>
+              </a:rPr>
+              <a:t> = GRAY  // mark as seen</a:t>
+            </a:r>
+          </a:p>
+          <a:p>
+            <a:r>
+              <a:rPr lang="en-US" altLang="en-US" dirty="0">
+                <a:latin typeface="Calibri" panose="020F0502020204030204" pitchFamily="34" charset="0"/>
+              </a:rPr>
+              <a:t>4   for each v in </a:t>
+            </a:r>
+            <a:r>
+              <a:rPr lang="en-US" altLang="en-US" dirty="0" err="1">
+                <a:latin typeface="Calibri" panose="020F0502020204030204" pitchFamily="34" charset="0"/>
+              </a:rPr>
+              <a:t>G.Adj</a:t>
+            </a:r>
+            <a:r>
+              <a:rPr lang="en-US" altLang="en-US" dirty="0">
+                <a:latin typeface="Calibri" panose="020F0502020204030204" pitchFamily="34" charset="0"/>
+              </a:rPr>
+              <a:t>[u]  // explore edge (u, v)</a:t>
+            </a:r>
+          </a:p>
+          <a:p>
+            <a:r>
+              <a:rPr lang="en-US" altLang="en-US" dirty="0">
+                <a:latin typeface="Calibri" panose="020F0502020204030204" pitchFamily="34" charset="0"/>
+              </a:rPr>
+              <a:t>5       if </a:t>
+            </a:r>
+            <a:r>
+              <a:rPr lang="en-US" altLang="en-US" dirty="0" err="1">
+                <a:latin typeface="Calibri" panose="020F0502020204030204" pitchFamily="34" charset="0"/>
+              </a:rPr>
+              <a:t>v.color</a:t>
+            </a:r>
+            <a:r>
+              <a:rPr lang="en-US" altLang="en-US" dirty="0">
+                <a:latin typeface="Calibri" panose="020F0502020204030204" pitchFamily="34" charset="0"/>
+              </a:rPr>
+              <a:t> == WHITE   // if unseen</a:t>
+            </a:r>
+          </a:p>
+          <a:p>
+            <a:r>
+              <a:rPr lang="en-US" altLang="en-US" dirty="0">
+                <a:latin typeface="Calibri" panose="020F0502020204030204" pitchFamily="34" charset="0"/>
+              </a:rPr>
+              <a:t>6           v.</a:t>
+            </a:r>
+            <a:r>
+              <a:rPr lang="el-GR" altLang="en-US" dirty="0">
                 <a:latin typeface="Calibri" panose="020F0502020204030204" pitchFamily="34" charset="0"/>
               </a:rPr>
               <a:t>π</a:t>
             </a:r>
             <a:r>
-              <a:rPr lang="en-US" altLang="en-US">
+              <a:rPr lang="en-US" altLang="en-US" dirty="0">
                 <a:latin typeface="Calibri" panose="020F0502020204030204" pitchFamily="34" charset="0"/>
               </a:rPr>
-              <a:t> = NIL</a:t>
-            </a:r>
-          </a:p>
-          <a:p>
-            <a:r>
-              <a:rPr lang="en-US" altLang="en-US">
+              <a:t> = u</a:t>
+            </a:r>
+          </a:p>
+          <a:p>
+            <a:r>
+              <a:rPr lang="en-US" altLang="en-US" dirty="0">
                 <a:latin typeface="Calibri" panose="020F0502020204030204" pitchFamily="34" charset="0"/>
               </a:rPr>
-              <a:t>4 time = 0</a:t>
-            </a:r>
-          </a:p>
-          <a:p>
-            <a:r>
-              <a:rPr lang="en-US" altLang="en-US">
+              <a:t>7           DFS-VISIT(G, v)  // explore paths out of v (i.e., go </a:t>
+            </a:r>
+            <a:r>
+              <a:rPr lang="ja-JP" altLang="en-US">
                 <a:latin typeface="Calibri" panose="020F0502020204030204" pitchFamily="34" charset="0"/>
               </a:rPr>
-              <a:t>5 for each vertex u in G.V</a:t>
-            </a:r>
-          </a:p>
-          <a:p>
-            <a:r>
-              <a:rPr lang="en-US" altLang="en-US">
+              <a:t>“</a:t>
+            </a:r>
+            <a:r>
+              <a:rPr lang="en-US" altLang="ja-JP" dirty="0">
                 <a:latin typeface="Calibri" panose="020F0502020204030204" pitchFamily="34" charset="0"/>
               </a:rPr>
-              <a:t>6       if u.color == WHITE  // if unseen</a:t>
-            </a:r>
-          </a:p>
-          <a:p>
-            <a:pPr>
-              <a:buFontTx/>
-              <a:buAutoNum type="arabicPlain" startAt="7"/>
-            </a:pPr>
-            <a:r>
-              <a:rPr lang="en-US" altLang="en-US">
+              <a:t>deeper</a:t>
+            </a:r>
+            <a:r>
+              <a:rPr lang="ja-JP" altLang="en-US">
                 <a:latin typeface="Calibri" panose="020F0502020204030204" pitchFamily="34" charset="0"/>
               </a:rPr>
-              <a:t>  DFS-VISIT(G, u)  // explore paths out of u</a:t>
-            </a:r>
-          </a:p>
-          <a:p>
-            <a:r>
-              <a:rPr lang="en-US" altLang="en-US">
-                <a:solidFill>
-                  <a:srgbClr val="FF0000"/>
-                </a:solidFill>
+              <a:t>”</a:t>
+            </a:r>
+            <a:r>
+              <a:rPr lang="en-US" altLang="ja-JP" dirty="0">
                 <a:latin typeface="Calibri" panose="020F0502020204030204" pitchFamily="34" charset="0"/>
               </a:rPr>
-              <a:t>8 // toposort-list contains the result</a:t>
-            </a:r>
-          </a:p>
-        </p:txBody>
-      </p:sp>
-      <p:sp>
-        <p:nvSpPr>
-          <p:cNvPr id="2" name="TextBox 1">
-            <a:extLst>
-              <a:ext uri="{FF2B5EF4-FFF2-40B4-BE49-F238E27FC236}">
-                <a16:creationId xmlns:a16="http://schemas.microsoft.com/office/drawing/2014/main" id="{379BFD4C-D4C1-F048-8047-8BF1A1C1ED58}"/>
-              </a:ext>
-            </a:extLst>
-          </p:cNvPr>
-          <p:cNvSpPr txBox="1"/>
-          <p:nvPr/>
-        </p:nvSpPr>
-        <p:spPr>
-          <a:xfrm>
-            <a:off x="990600" y="1447801"/>
-            <a:ext cx="8763000" cy="830997"/>
-          </a:xfrm>
-          <a:prstGeom prst="rect">
-            <a:avLst/>
-          </a:prstGeom>
-          <a:noFill/>
-        </p:spPr>
-        <p:txBody>
-          <a:bodyPr wrap="square">
-            <a:spAutoFit/>
-          </a:bodyPr>
-          <a:lstStyle/>
-          <a:p>
-            <a:pPr marL="342900" indent="-342900">
-              <a:buFont typeface="Arial"/>
-              <a:buChar char="•"/>
-              <a:defRPr/>
-            </a:pPr>
-            <a:r>
-              <a:rPr lang="en-US" sz="2400" dirty="0">
-                <a:ea typeface="ＭＳ Ｐゴシック" charset="0"/>
-                <a:cs typeface="ＭＳ Ｐゴシック" charset="0"/>
+              <a:t>)</a:t>
+            </a:r>
+          </a:p>
+          <a:p>
+            <a:r>
+              <a:rPr lang="en-US" altLang="en-US" dirty="0">
+                <a:latin typeface="Calibri" panose="020F0502020204030204" pitchFamily="34" charset="0"/>
               </a:rPr>
-              <a:t>Strategy: modify the two DFS functions so that they order nodes by finish-time in reverse order.  This slide:  DFS “Sweep”.</a:t>
+              <a:t>8   </a:t>
+            </a:r>
+            <a:r>
+              <a:rPr lang="en-US" altLang="en-US" dirty="0" err="1">
+                <a:latin typeface="Calibri" panose="020F0502020204030204" pitchFamily="34" charset="0"/>
+              </a:rPr>
+              <a:t>u.color</a:t>
+            </a:r>
+            <a:r>
+              <a:rPr lang="en-US" altLang="en-US" dirty="0">
+                <a:latin typeface="Calibri" panose="020F0502020204030204" pitchFamily="34" charset="0"/>
+              </a:rPr>
+              <a:t> = BLACK  // u is finished</a:t>
+            </a:r>
+          </a:p>
+          <a:p>
+            <a:r>
+              <a:rPr lang="en-US" altLang="en-US" dirty="0">
+                <a:latin typeface="Calibri" panose="020F0502020204030204" pitchFamily="34" charset="0"/>
+              </a:rPr>
+              <a:t>9   time = time + 1</a:t>
+            </a:r>
+          </a:p>
+          <a:p>
+            <a:r>
+              <a:rPr lang="en-US" altLang="en-US" dirty="0">
+                <a:latin typeface="Calibri" panose="020F0502020204030204" pitchFamily="34" charset="0"/>
+              </a:rPr>
+              <a:t>10 </a:t>
+            </a:r>
+            <a:r>
+              <a:rPr lang="en-US" altLang="en-US" dirty="0" err="1">
+                <a:latin typeface="Calibri" panose="020F0502020204030204" pitchFamily="34" charset="0"/>
+              </a:rPr>
+              <a:t>u.f</a:t>
+            </a:r>
+            <a:r>
+              <a:rPr lang="en-US" altLang="en-US" dirty="0">
+                <a:latin typeface="Calibri" panose="020F0502020204030204" pitchFamily="34" charset="0"/>
+              </a:rPr>
+              <a:t> = time  // finish time of u</a:t>
+            </a:r>
+          </a:p>
+          <a:p>
+            <a:r>
+              <a:rPr lang="en-US" altLang="en-US" dirty="0">
+                <a:solidFill>
+                  <a:srgbClr val="FF0000"/>
+                </a:solidFill>
+                <a:latin typeface="Calibri" panose="020F0502020204030204" pitchFamily="34" charset="0"/>
+              </a:rPr>
+              <a:t>11 </a:t>
+            </a:r>
+            <a:r>
+              <a:rPr lang="en-US" altLang="en-US" dirty="0" err="1">
+                <a:solidFill>
+                  <a:srgbClr val="FF0000"/>
+                </a:solidFill>
+                <a:latin typeface="Calibri" panose="020F0502020204030204" pitchFamily="34" charset="0"/>
+              </a:rPr>
+              <a:t>toposort-list.prepend</a:t>
+            </a:r>
+            <a:r>
+              <a:rPr lang="en-US" altLang="en-US" dirty="0">
+                <a:solidFill>
+                  <a:srgbClr val="FF0000"/>
+                </a:solidFill>
+                <a:latin typeface="Calibri" panose="020F0502020204030204" pitchFamily="34" charset="0"/>
+              </a:rPr>
+              <a:t>(u)</a:t>
             </a:r>
           </a:p>
         </p:txBody>
@@ -11533,7 +11845,7 @@
     </p:spTree>
     <p:extLst>
       <p:ext uri="{BB962C8B-B14F-4D97-AF65-F5344CB8AC3E}">
-        <p14:creationId xmlns:p14="http://schemas.microsoft.com/office/powerpoint/2010/main" val="2788001959"/>
+        <p14:creationId xmlns:p14="http://schemas.microsoft.com/office/powerpoint/2010/main" val="3235894297"/>
       </p:ext>
     </p:extLst>
   </p:cSld>
@@ -11739,458 +12051,6 @@
       </p:grpSpPr>
       <p:sp>
         <p:nvSpPr>
-          <p:cNvPr id="62465" name="Title 1">
-            <a:extLst>
-              <a:ext uri="{FF2B5EF4-FFF2-40B4-BE49-F238E27FC236}">
-                <a16:creationId xmlns:a16="http://schemas.microsoft.com/office/drawing/2014/main" id="{5BEDDCEA-AA79-9C43-BAEF-F779F7FC8923}"/>
-              </a:ext>
-            </a:extLst>
-          </p:cNvPr>
-          <p:cNvSpPr>
-            <a:spLocks noGrp="1"/>
-          </p:cNvSpPr>
-          <p:nvPr>
-            <p:ph type="title"/>
-          </p:nvPr>
-        </p:nvSpPr>
-        <p:spPr>
-          <a:xfrm>
-            <a:off x="1981200" y="228601"/>
-            <a:ext cx="8229600" cy="631825"/>
-          </a:xfrm>
-        </p:spPr>
-        <p:txBody>
-          <a:bodyPr>
-            <a:normAutofit fontScale="90000"/>
-          </a:bodyPr>
-          <a:lstStyle/>
-          <a:p>
-            <a:r>
-              <a:rPr lang="en-US" altLang="en-US">
-                <a:latin typeface="Calibri" panose="020F0502020204030204" pitchFamily="34" charset="0"/>
-                <a:ea typeface="ＭＳ Ｐゴシック" panose="020B0600070205080204" pitchFamily="34" charset="-128"/>
-              </a:rPr>
-              <a:t>Topological Sort Algorithm</a:t>
-            </a:r>
-          </a:p>
-        </p:txBody>
-      </p:sp>
-      <p:sp>
-        <p:nvSpPr>
-          <p:cNvPr id="62466" name="TextBox 3">
-            <a:extLst>
-              <a:ext uri="{FF2B5EF4-FFF2-40B4-BE49-F238E27FC236}">
-                <a16:creationId xmlns:a16="http://schemas.microsoft.com/office/drawing/2014/main" id="{8FCA770D-B9F0-5F45-A684-BEF101128CDF}"/>
-              </a:ext>
-            </a:extLst>
-          </p:cNvPr>
-          <p:cNvSpPr txBox="1">
-            <a:spLocks noChangeArrowheads="1"/>
-          </p:cNvSpPr>
-          <p:nvPr/>
-        </p:nvSpPr>
-        <p:spPr bwMode="auto">
-          <a:xfrm>
-            <a:off x="1711325" y="1524000"/>
-            <a:ext cx="8499475" cy="4524375"/>
-          </a:xfrm>
-          <a:prstGeom prst="rect">
-            <a:avLst/>
-          </a:prstGeom>
-          <a:noFill/>
-          <a:ln>
-            <a:noFill/>
-          </a:ln>
-          <a:extLst>
-            <a:ext uri="{909E8E84-426E-40DD-AFC4-6F175D3DCCD1}">
-              <a14:hiddenFill xmlns:a14="http://schemas.microsoft.com/office/drawing/2010/main">
-                <a:solidFill>
-                  <a:srgbClr val="FFFFFF"/>
-                </a:solidFill>
-              </a14:hiddenFill>
-            </a:ext>
-            <a:ext uri="{91240B29-F687-4F45-9708-019B960494DF}">
-              <a14:hiddenLine xmlns:a14="http://schemas.microsoft.com/office/drawing/2010/main" w="9525">
-                <a:solidFill>
-                  <a:srgbClr val="000000"/>
-                </a:solidFill>
-                <a:miter lim="800000"/>
-                <a:headEnd/>
-                <a:tailEnd/>
-              </a14:hiddenLine>
-            </a:ext>
-          </a:extLst>
-        </p:spPr>
-        <p:txBody>
-          <a:bodyPr wrap="none">
-            <a:spAutoFit/>
-          </a:bodyPr>
-          <a:lstStyle>
-            <a:lvl1pPr>
-              <a:defRPr sz="2400">
-                <a:solidFill>
-                  <a:schemeClr val="tx1"/>
-                </a:solidFill>
-                <a:latin typeface="Times New Roman" panose="02020603050405020304" pitchFamily="18" charset="0"/>
-                <a:ea typeface="ＭＳ Ｐゴシック" panose="020B0600070205080204" pitchFamily="34" charset="-128"/>
-              </a:defRPr>
-            </a:lvl1pPr>
-            <a:lvl2pPr marL="742950" indent="-285750">
-              <a:defRPr sz="2400">
-                <a:solidFill>
-                  <a:schemeClr val="tx1"/>
-                </a:solidFill>
-                <a:latin typeface="Times New Roman" panose="02020603050405020304" pitchFamily="18" charset="0"/>
-                <a:ea typeface="ＭＳ Ｐゴシック" panose="020B0600070205080204" pitchFamily="34" charset="-128"/>
-              </a:defRPr>
-            </a:lvl2pPr>
-            <a:lvl3pPr marL="1143000" indent="-228600">
-              <a:defRPr sz="2400">
-                <a:solidFill>
-                  <a:schemeClr val="tx1"/>
-                </a:solidFill>
-                <a:latin typeface="Times New Roman" panose="02020603050405020304" pitchFamily="18" charset="0"/>
-                <a:ea typeface="ＭＳ Ｐゴシック" panose="020B0600070205080204" pitchFamily="34" charset="-128"/>
-              </a:defRPr>
-            </a:lvl3pPr>
-            <a:lvl4pPr marL="1600200" indent="-228600">
-              <a:defRPr sz="2400">
-                <a:solidFill>
-                  <a:schemeClr val="tx1"/>
-                </a:solidFill>
-                <a:latin typeface="Times New Roman" panose="02020603050405020304" pitchFamily="18" charset="0"/>
-                <a:ea typeface="ＭＳ Ｐゴシック" panose="020B0600070205080204" pitchFamily="34" charset="-128"/>
-              </a:defRPr>
-            </a:lvl4pPr>
-            <a:lvl5pPr marL="2057400" indent="-228600">
-              <a:defRPr sz="2400">
-                <a:solidFill>
-                  <a:schemeClr val="tx1"/>
-                </a:solidFill>
-                <a:latin typeface="Times New Roman" panose="02020603050405020304" pitchFamily="18" charset="0"/>
-                <a:ea typeface="ＭＳ Ｐゴシック" panose="020B0600070205080204" pitchFamily="34" charset="-128"/>
-              </a:defRPr>
-            </a:lvl5pPr>
-            <a:lvl6pPr marL="2514600" indent="-228600" eaLnBrk="0" fontAlgn="base" hangingPunct="0">
-              <a:spcBef>
-                <a:spcPct val="0"/>
-              </a:spcBef>
-              <a:spcAft>
-                <a:spcPct val="0"/>
-              </a:spcAft>
-              <a:defRPr sz="2400">
-                <a:solidFill>
-                  <a:schemeClr val="tx1"/>
-                </a:solidFill>
-                <a:latin typeface="Times New Roman" panose="02020603050405020304" pitchFamily="18" charset="0"/>
-                <a:ea typeface="ＭＳ Ｐゴシック" panose="020B0600070205080204" pitchFamily="34" charset="-128"/>
-              </a:defRPr>
-            </a:lvl6pPr>
-            <a:lvl7pPr marL="2971800" indent="-228600" eaLnBrk="0" fontAlgn="base" hangingPunct="0">
-              <a:spcBef>
-                <a:spcPct val="0"/>
-              </a:spcBef>
-              <a:spcAft>
-                <a:spcPct val="0"/>
-              </a:spcAft>
-              <a:defRPr sz="2400">
-                <a:solidFill>
-                  <a:schemeClr val="tx1"/>
-                </a:solidFill>
-                <a:latin typeface="Times New Roman" panose="02020603050405020304" pitchFamily="18" charset="0"/>
-                <a:ea typeface="ＭＳ Ｐゴシック" panose="020B0600070205080204" pitchFamily="34" charset="-128"/>
-              </a:defRPr>
-            </a:lvl7pPr>
-            <a:lvl8pPr marL="3429000" indent="-228600" eaLnBrk="0" fontAlgn="base" hangingPunct="0">
-              <a:spcBef>
-                <a:spcPct val="0"/>
-              </a:spcBef>
-              <a:spcAft>
-                <a:spcPct val="0"/>
-              </a:spcAft>
-              <a:defRPr sz="2400">
-                <a:solidFill>
-                  <a:schemeClr val="tx1"/>
-                </a:solidFill>
-                <a:latin typeface="Times New Roman" panose="02020603050405020304" pitchFamily="18" charset="0"/>
-                <a:ea typeface="ＭＳ Ｐゴシック" panose="020B0600070205080204" pitchFamily="34" charset="-128"/>
-              </a:defRPr>
-            </a:lvl8pPr>
-            <a:lvl9pPr marL="3886200" indent="-228600" eaLnBrk="0" fontAlgn="base" hangingPunct="0">
-              <a:spcBef>
-                <a:spcPct val="0"/>
-              </a:spcBef>
-              <a:spcAft>
-                <a:spcPct val="0"/>
-              </a:spcAft>
-              <a:defRPr sz="2400">
-                <a:solidFill>
-                  <a:schemeClr val="tx1"/>
-                </a:solidFill>
-                <a:latin typeface="Times New Roman" panose="02020603050405020304" pitchFamily="18" charset="0"/>
-                <a:ea typeface="ＭＳ Ｐゴシック" panose="020B0600070205080204" pitchFamily="34" charset="-128"/>
-              </a:defRPr>
-            </a:lvl9pPr>
-          </a:lstStyle>
-          <a:p>
-            <a:r>
-              <a:rPr lang="en-US" altLang="en-US" dirty="0">
-                <a:latin typeface="Calibri" panose="020F0502020204030204" pitchFamily="34" charset="0"/>
-              </a:rPr>
-              <a:t>DFS-VISIT(G, u)</a:t>
-            </a:r>
-          </a:p>
-          <a:p>
-            <a:r>
-              <a:rPr lang="en-US" altLang="en-US" dirty="0">
-                <a:latin typeface="Calibri" panose="020F0502020204030204" pitchFamily="34" charset="0"/>
-              </a:rPr>
-              <a:t>1   time = time + 1  // white vertex u has just been discovered</a:t>
-            </a:r>
-          </a:p>
-          <a:p>
-            <a:r>
-              <a:rPr lang="en-US" altLang="en-US" dirty="0">
-                <a:latin typeface="Calibri" panose="020F0502020204030204" pitchFamily="34" charset="0"/>
-              </a:rPr>
-              <a:t>2   </a:t>
-            </a:r>
-            <a:r>
-              <a:rPr lang="en-US" altLang="en-US" dirty="0" err="1">
-                <a:latin typeface="Calibri" panose="020F0502020204030204" pitchFamily="34" charset="0"/>
-              </a:rPr>
-              <a:t>u.d</a:t>
-            </a:r>
-            <a:r>
-              <a:rPr lang="en-US" altLang="en-US" dirty="0">
-                <a:latin typeface="Calibri" panose="020F0502020204030204" pitchFamily="34" charset="0"/>
-              </a:rPr>
-              <a:t> = time  // discovery time of u</a:t>
-            </a:r>
-          </a:p>
-          <a:p>
-            <a:r>
-              <a:rPr lang="en-US" altLang="en-US" dirty="0">
-                <a:latin typeface="Calibri" panose="020F0502020204030204" pitchFamily="34" charset="0"/>
-              </a:rPr>
-              <a:t>3   </a:t>
-            </a:r>
-            <a:r>
-              <a:rPr lang="en-US" altLang="en-US" dirty="0" err="1">
-                <a:latin typeface="Calibri" panose="020F0502020204030204" pitchFamily="34" charset="0"/>
-              </a:rPr>
-              <a:t>u.color</a:t>
-            </a:r>
-            <a:r>
-              <a:rPr lang="en-US" altLang="en-US" dirty="0">
-                <a:latin typeface="Calibri" panose="020F0502020204030204" pitchFamily="34" charset="0"/>
-              </a:rPr>
-              <a:t> = GRAY  // mark as seen</a:t>
-            </a:r>
-          </a:p>
-          <a:p>
-            <a:r>
-              <a:rPr lang="en-US" altLang="en-US" dirty="0">
-                <a:latin typeface="Calibri" panose="020F0502020204030204" pitchFamily="34" charset="0"/>
-              </a:rPr>
-              <a:t>4   for each v in </a:t>
-            </a:r>
-            <a:r>
-              <a:rPr lang="en-US" altLang="en-US" dirty="0" err="1">
-                <a:latin typeface="Calibri" panose="020F0502020204030204" pitchFamily="34" charset="0"/>
-              </a:rPr>
-              <a:t>G.Adj</a:t>
-            </a:r>
-            <a:r>
-              <a:rPr lang="en-US" altLang="en-US" dirty="0">
-                <a:latin typeface="Calibri" panose="020F0502020204030204" pitchFamily="34" charset="0"/>
-              </a:rPr>
-              <a:t>[u]  // explore edge (u, v)</a:t>
-            </a:r>
-          </a:p>
-          <a:p>
-            <a:r>
-              <a:rPr lang="en-US" altLang="en-US" dirty="0">
-                <a:latin typeface="Calibri" panose="020F0502020204030204" pitchFamily="34" charset="0"/>
-              </a:rPr>
-              <a:t>5       if </a:t>
-            </a:r>
-            <a:r>
-              <a:rPr lang="en-US" altLang="en-US" dirty="0" err="1">
-                <a:latin typeface="Calibri" panose="020F0502020204030204" pitchFamily="34" charset="0"/>
-              </a:rPr>
-              <a:t>v.color</a:t>
-            </a:r>
-            <a:r>
-              <a:rPr lang="en-US" altLang="en-US" dirty="0">
-                <a:latin typeface="Calibri" panose="020F0502020204030204" pitchFamily="34" charset="0"/>
-              </a:rPr>
-              <a:t> == WHITE   // if unseen</a:t>
-            </a:r>
-          </a:p>
-          <a:p>
-            <a:r>
-              <a:rPr lang="en-US" altLang="en-US" dirty="0">
-                <a:latin typeface="Calibri" panose="020F0502020204030204" pitchFamily="34" charset="0"/>
-              </a:rPr>
-              <a:t>6           v.</a:t>
-            </a:r>
-            <a:r>
-              <a:rPr lang="el-GR" altLang="en-US" dirty="0">
-                <a:latin typeface="Calibri" panose="020F0502020204030204" pitchFamily="34" charset="0"/>
-              </a:rPr>
-              <a:t>π</a:t>
-            </a:r>
-            <a:r>
-              <a:rPr lang="en-US" altLang="en-US" dirty="0">
-                <a:latin typeface="Calibri" panose="020F0502020204030204" pitchFamily="34" charset="0"/>
-              </a:rPr>
-              <a:t> = u</a:t>
-            </a:r>
-          </a:p>
-          <a:p>
-            <a:r>
-              <a:rPr lang="en-US" altLang="en-US" dirty="0">
-                <a:latin typeface="Calibri" panose="020F0502020204030204" pitchFamily="34" charset="0"/>
-              </a:rPr>
-              <a:t>7           DFS-VISIT(G, v)  // explore paths out of v (i.e., go </a:t>
-            </a:r>
-            <a:r>
-              <a:rPr lang="ja-JP" altLang="en-US">
-                <a:latin typeface="Calibri" panose="020F0502020204030204" pitchFamily="34" charset="0"/>
-              </a:rPr>
-              <a:t>“</a:t>
-            </a:r>
-            <a:r>
-              <a:rPr lang="en-US" altLang="ja-JP" dirty="0">
-                <a:latin typeface="Calibri" panose="020F0502020204030204" pitchFamily="34" charset="0"/>
-              </a:rPr>
-              <a:t>deeper</a:t>
-            </a:r>
-            <a:r>
-              <a:rPr lang="ja-JP" altLang="en-US">
-                <a:latin typeface="Calibri" panose="020F0502020204030204" pitchFamily="34" charset="0"/>
-              </a:rPr>
-              <a:t>”</a:t>
-            </a:r>
-            <a:r>
-              <a:rPr lang="en-US" altLang="ja-JP" dirty="0">
-                <a:latin typeface="Calibri" panose="020F0502020204030204" pitchFamily="34" charset="0"/>
-              </a:rPr>
-              <a:t>)</a:t>
-            </a:r>
-          </a:p>
-          <a:p>
-            <a:r>
-              <a:rPr lang="en-US" altLang="en-US" dirty="0">
-                <a:latin typeface="Calibri" panose="020F0502020204030204" pitchFamily="34" charset="0"/>
-              </a:rPr>
-              <a:t>8   </a:t>
-            </a:r>
-            <a:r>
-              <a:rPr lang="en-US" altLang="en-US" dirty="0" err="1">
-                <a:latin typeface="Calibri" panose="020F0502020204030204" pitchFamily="34" charset="0"/>
-              </a:rPr>
-              <a:t>u.color</a:t>
-            </a:r>
-            <a:r>
-              <a:rPr lang="en-US" altLang="en-US" dirty="0">
-                <a:latin typeface="Calibri" panose="020F0502020204030204" pitchFamily="34" charset="0"/>
-              </a:rPr>
-              <a:t> = BLACK  // u is finished</a:t>
-            </a:r>
-          </a:p>
-          <a:p>
-            <a:r>
-              <a:rPr lang="en-US" altLang="en-US" dirty="0">
-                <a:latin typeface="Calibri" panose="020F0502020204030204" pitchFamily="34" charset="0"/>
-              </a:rPr>
-              <a:t>9   time = time + 1</a:t>
-            </a:r>
-          </a:p>
-          <a:p>
-            <a:r>
-              <a:rPr lang="en-US" altLang="en-US" dirty="0">
-                <a:latin typeface="Calibri" panose="020F0502020204030204" pitchFamily="34" charset="0"/>
-              </a:rPr>
-              <a:t>10 </a:t>
-            </a:r>
-            <a:r>
-              <a:rPr lang="en-US" altLang="en-US" dirty="0" err="1">
-                <a:latin typeface="Calibri" panose="020F0502020204030204" pitchFamily="34" charset="0"/>
-              </a:rPr>
-              <a:t>u.f</a:t>
-            </a:r>
-            <a:r>
-              <a:rPr lang="en-US" altLang="en-US" dirty="0">
-                <a:latin typeface="Calibri" panose="020F0502020204030204" pitchFamily="34" charset="0"/>
-              </a:rPr>
-              <a:t> = time  // finish time of u</a:t>
-            </a:r>
-          </a:p>
-          <a:p>
-            <a:r>
-              <a:rPr lang="en-US" altLang="en-US" dirty="0">
-                <a:solidFill>
-                  <a:srgbClr val="FF0000"/>
-                </a:solidFill>
-                <a:latin typeface="Calibri" panose="020F0502020204030204" pitchFamily="34" charset="0"/>
-              </a:rPr>
-              <a:t>11 </a:t>
-            </a:r>
-            <a:r>
-              <a:rPr lang="en-US" altLang="en-US" dirty="0" err="1">
-                <a:solidFill>
-                  <a:srgbClr val="FF0000"/>
-                </a:solidFill>
-                <a:latin typeface="Calibri" panose="020F0502020204030204" pitchFamily="34" charset="0"/>
-              </a:rPr>
-              <a:t>toposort-list.prepend</a:t>
-            </a:r>
-            <a:r>
-              <a:rPr lang="en-US" altLang="en-US" dirty="0">
-                <a:solidFill>
-                  <a:srgbClr val="FF0000"/>
-                </a:solidFill>
-                <a:latin typeface="Calibri" panose="020F0502020204030204" pitchFamily="34" charset="0"/>
-              </a:rPr>
-              <a:t>(u)</a:t>
-            </a:r>
-          </a:p>
-        </p:txBody>
-      </p:sp>
-    </p:spTree>
-    <p:extLst>
-      <p:ext uri="{BB962C8B-B14F-4D97-AF65-F5344CB8AC3E}">
-        <p14:creationId xmlns:p14="http://schemas.microsoft.com/office/powerpoint/2010/main" val="3235894297"/>
-      </p:ext>
-    </p:extLst>
-  </p:cSld>
-  <p:clrMapOvr>
-    <a:masterClrMapping/>
-  </p:clrMapOvr>
-</p:sld>
-</file>
-
-<file path=ppt/slides/slide31.xml><?xml version="1.0" encoding="utf-8"?>
-<p:sld xmlns:a="http://schemas.openxmlformats.org/drawingml/2006/main" xmlns:r="http://schemas.openxmlformats.org/officeDocument/2006/relationships" xmlns:p="http://schemas.openxmlformats.org/presentationml/2006/main">
-  <p:cSld>
-    <p:spTree>
-      <p:nvGrpSpPr>
-        <p:cNvPr id="1" name=""/>
-        <p:cNvGrpSpPr/>
-        <p:nvPr/>
-      </p:nvGrpSpPr>
-      <p:grpSpPr>
-        <a:xfrm>
-          <a:off x="0" y="0"/>
-          <a:ext cx="0" cy="0"/>
-          <a:chOff x="0" y="0"/>
-          <a:chExt cx="0" cy="0"/>
-        </a:xfrm>
-      </p:grpSpPr>
-      <p:sp>
-        <p:nvSpPr>
           <p:cNvPr id="63489" name="Rectangle 2">
             <a:extLst>
               <a:ext uri="{FF2B5EF4-FFF2-40B4-BE49-F238E27FC236}">
@@ -12420,7 +12280,7 @@
 </p:sld>
 </file>
 
-<file path=ppt/slides/slide32.xml><?xml version="1.0" encoding="utf-8"?>
+<file path=ppt/slides/slide31.xml><?xml version="1.0" encoding="utf-8"?>
 <p:sld xmlns:a="http://schemas.openxmlformats.org/drawingml/2006/main" xmlns:r="http://schemas.openxmlformats.org/officeDocument/2006/relationships" xmlns:p="http://schemas.openxmlformats.org/presentationml/2006/main">
   <p:cSld>
     <p:spTree>
@@ -14020,6 +13880,117 @@
 </p:sld>
 </file>
 
+<file path=ppt/slides/slide32.xml><?xml version="1.0" encoding="utf-8"?>
+<p:sld xmlns:a="http://schemas.openxmlformats.org/drawingml/2006/main" xmlns:r="http://schemas.openxmlformats.org/officeDocument/2006/relationships" xmlns:p="http://schemas.openxmlformats.org/presentationml/2006/main">
+  <p:cSld>
+    <p:spTree>
+      <p:nvGrpSpPr>
+        <p:cNvPr id="1" name=""/>
+        <p:cNvGrpSpPr/>
+        <p:nvPr/>
+      </p:nvGrpSpPr>
+      <p:grpSpPr>
+        <a:xfrm>
+          <a:off x="0" y="0"/>
+          <a:ext cx="0" cy="0"/>
+          <a:chOff x="0" y="0"/>
+          <a:chExt cx="0" cy="0"/>
+        </a:xfrm>
+      </p:grpSpPr>
+      <p:sp>
+        <p:nvSpPr>
+          <p:cNvPr id="2" name="Title 1"/>
+          <p:cNvSpPr>
+            <a:spLocks noGrp="1"/>
+          </p:cNvSpPr>
+          <p:nvPr>
+            <p:ph type="ctrTitle"/>
+          </p:nvPr>
+        </p:nvSpPr>
+        <p:spPr/>
+        <p:txBody>
+          <a:bodyPr>
+            <a:normAutofit/>
+          </a:bodyPr>
+          <a:lstStyle/>
+          <a:p>
+            <a:r>
+              <a:rPr lang="en-US" dirty="0"/>
+              <a:t>Strongly Connected Components</a:t>
+            </a:r>
+            <a:br>
+              <a:rPr lang="en-US" dirty="0"/>
+            </a:br>
+            <a:r>
+              <a:rPr lang="en-US" dirty="0"/>
+              <a:t>in a Digraph</a:t>
+            </a:r>
+          </a:p>
+        </p:txBody>
+      </p:sp>
+      <p:sp>
+        <p:nvSpPr>
+          <p:cNvPr id="3" name="Subtitle 2"/>
+          <p:cNvSpPr>
+            <a:spLocks noGrp="1"/>
+          </p:cNvSpPr>
+          <p:nvPr>
+            <p:ph type="subTitle" idx="1"/>
+          </p:nvPr>
+        </p:nvSpPr>
+        <p:spPr/>
+        <p:txBody>
+          <a:bodyPr/>
+          <a:lstStyle/>
+          <a:p>
+            <a:r>
+              <a:rPr lang="en-US" dirty="0"/>
+              <a:t>Readings:  CLRS 22.5, but you can ignore the proof-y parts</a:t>
+            </a:r>
+          </a:p>
+        </p:txBody>
+      </p:sp>
+      <p:sp>
+        <p:nvSpPr>
+          <p:cNvPr id="4" name="Slide Number Placeholder 3"/>
+          <p:cNvSpPr>
+            <a:spLocks noGrp="1"/>
+          </p:cNvSpPr>
+          <p:nvPr>
+            <p:ph type="sldNum" sz="quarter" idx="12"/>
+          </p:nvPr>
+        </p:nvSpPr>
+        <p:spPr>
+          <a:prstGeom prst="rect">
+            <a:avLst/>
+          </a:prstGeom>
+        </p:spPr>
+        <p:txBody>
+          <a:bodyPr/>
+          <a:lstStyle/>
+          <a:p>
+            <a:fld id="{DACC1BBE-66B1-403A-8C7E-C57A0F3A107F}" type="slidenum">
+              <a:rPr lang="en-US" smtClean="0"/>
+              <a:pPr/>
+              <a:t>32</a:t>
+            </a:fld>
+            <a:endParaRPr lang="en-US"/>
+          </a:p>
+        </p:txBody>
+      </p:sp>
+    </p:spTree>
+    <p:extLst>
+      <p:ext uri="{BB962C8B-B14F-4D97-AF65-F5344CB8AC3E}">
+        <p14:creationId xmlns:p14="http://schemas.microsoft.com/office/powerpoint/2010/main" val="850536261"/>
+      </p:ext>
+    </p:extLst>
+  </p:cSld>
+  <p:clrMapOvr>
+    <a:masterClrMapping/>
+  </p:clrMapOvr>
+</p:sld>
+</file>
+
 <file path=ppt/slides/slide33.xml><?xml version="1.0" encoding="utf-8"?>
 <p:sld xmlns:a="http://schemas.openxmlformats.org/drawingml/2006/main" xmlns:r="http://schemas.openxmlformats.org/officeDocument/2006/relationships" xmlns:p="http://schemas.openxmlformats.org/presentationml/2006/main">
   <p:cSld>
@@ -14039,43 +14010,18 @@
       </p:grpSpPr>
       <p:sp>
         <p:nvSpPr>
-          <p:cNvPr id="2" name="Title 1"/>
+          <p:cNvPr id="2" name="Title 1">
+            <a:extLst>
+              <a:ext uri="{FF2B5EF4-FFF2-40B4-BE49-F238E27FC236}">
+                <a16:creationId xmlns:a16="http://schemas.microsoft.com/office/drawing/2014/main" id="{038C0EC6-8705-B948-9282-63C3BF8214BF}"/>
+              </a:ext>
+            </a:extLst>
+          </p:cNvPr>
           <p:cNvSpPr>
             <a:spLocks noGrp="1"/>
           </p:cNvSpPr>
           <p:nvPr>
-            <p:ph type="ctrTitle"/>
-          </p:nvPr>
-        </p:nvSpPr>
-        <p:spPr/>
-        <p:txBody>
-          <a:bodyPr>
-            <a:normAutofit/>
-          </a:bodyPr>
-          <a:lstStyle/>
-          <a:p>
-            <a:r>
-              <a:rPr lang="en-US" dirty="0"/>
-              <a:t>Strongly Connected Components</a:t>
-            </a:r>
-            <a:br>
-              <a:rPr lang="en-US" dirty="0"/>
-            </a:br>
-            <a:r>
-              <a:rPr lang="en-US" dirty="0"/>
-              <a:t>in a Digraph</a:t>
-            </a:r>
-          </a:p>
-        </p:txBody>
-      </p:sp>
-      <p:sp>
-        <p:nvSpPr>
-          <p:cNvPr id="3" name="Subtitle 2"/>
-          <p:cNvSpPr>
-            <a:spLocks noGrp="1"/>
-          </p:cNvSpPr>
-          <p:nvPr>
-            <p:ph type="subTitle" idx="1"/>
+            <p:ph type="title"/>
           </p:nvPr>
         </p:nvSpPr>
         <p:spPr/>
@@ -14085,33 +14031,93 @@
           <a:p>
             <a:r>
               <a:rPr lang="en-US" dirty="0"/>
-              <a:t>Readings:  CLRS 22.5, but you can ignore the proof-y parts</a:t>
-            </a:r>
-          </a:p>
-        </p:txBody>
-      </p:sp>
-      <p:sp>
-        <p:nvSpPr>
-          <p:cNvPr id="4" name="Slide Number Placeholder 3"/>
+              <a:t>Strongly Connected Components (SCCs)</a:t>
+            </a:r>
+          </a:p>
+        </p:txBody>
+      </p:sp>
+      <p:sp>
+        <p:nvSpPr>
+          <p:cNvPr id="3" name="Content Placeholder 2">
+            <a:extLst>
+              <a:ext uri="{FF2B5EF4-FFF2-40B4-BE49-F238E27FC236}">
+                <a16:creationId xmlns:a16="http://schemas.microsoft.com/office/drawing/2014/main" id="{9B4F21D7-06BD-2C48-94FD-7ED9728D08D9}"/>
+              </a:ext>
+            </a:extLst>
+          </p:cNvPr>
           <p:cNvSpPr>
             <a:spLocks noGrp="1"/>
           </p:cNvSpPr>
           <p:nvPr>
-            <p:ph type="sldNum" sz="quarter" idx="12"/>
-          </p:nvPr>
-        </p:nvSpPr>
-        <p:spPr>
-          <a:prstGeom prst="rect">
-            <a:avLst/>
-          </a:prstGeom>
-        </p:spPr>
+            <p:ph idx="1"/>
+          </p:nvPr>
+        </p:nvSpPr>
+        <p:spPr/>
         <p:txBody>
           <a:bodyPr/>
           <a:lstStyle/>
           <a:p>
-            <a:fld id="{DACC1BBE-66B1-403A-8C7E-C57A0F3A107F}" type="slidenum">
+            <a:r>
+              <a:rPr lang="en-US" dirty="0"/>
+              <a:t>In a digraph, Strongly Connected Components (SCCs) are subgraphs where all vertices in each SCC are reachable from one another</a:t>
+            </a:r>
+          </a:p>
+          <a:p>
+            <a:pPr lvl="1"/>
+            <a:r>
+              <a:rPr lang="en-US" dirty="0"/>
+              <a:t>Thus vertices in an SCC are on a directed cycle</a:t>
+            </a:r>
+          </a:p>
+          <a:p>
+            <a:pPr lvl="1"/>
+            <a:r>
+              <a:rPr lang="en-US" dirty="0"/>
+              <a:t>Any vertex not on a directed cycle is an SCC all by itself</a:t>
+            </a:r>
+          </a:p>
+          <a:p>
+            <a:r>
+              <a:rPr lang="en-US" dirty="0"/>
+              <a:t>Common need: decompose a digraph into its SCCs</a:t>
+            </a:r>
+          </a:p>
+          <a:p>
+            <a:pPr lvl="1"/>
+            <a:r>
+              <a:rPr lang="en-US" dirty="0"/>
+              <a:t>Perhaps then operate on each, combine results based on connections between SCCs</a:t>
+            </a:r>
+          </a:p>
+          <a:p>
+            <a:pPr lvl="1"/>
+            <a:endParaRPr lang="en-US" dirty="0"/>
+          </a:p>
+        </p:txBody>
+      </p:sp>
+      <p:sp>
+        <p:nvSpPr>
+          <p:cNvPr id="4" name="Slide Number Placeholder 3">
+            <a:extLst>
+              <a:ext uri="{FF2B5EF4-FFF2-40B4-BE49-F238E27FC236}">
+                <a16:creationId xmlns:a16="http://schemas.microsoft.com/office/drawing/2014/main" id="{B87F8B67-71E5-4344-830D-A1109F662DAF}"/>
+              </a:ext>
+            </a:extLst>
+          </p:cNvPr>
+          <p:cNvSpPr>
+            <a:spLocks noGrp="1"/>
+          </p:cNvSpPr>
+          <p:nvPr>
+            <p:ph type="sldNum" sz="quarter" idx="12"/>
+          </p:nvPr>
+        </p:nvSpPr>
+        <p:spPr/>
+        <p:txBody>
+          <a:bodyPr/>
+          <a:lstStyle/>
+          <a:p>
+            <a:fld id="{86BADE50-950A-4D58-BFB2-FA2C6A8B385D}" type="slidenum">
               <a:rPr lang="en-US" smtClean="0"/>
-              <a:pPr/>
               <a:t>33</a:t>
             </a:fld>
             <a:endParaRPr lang="en-US"/>
@@ -14121,7 +14127,7 @@
     </p:spTree>
     <p:extLst>
       <p:ext uri="{BB962C8B-B14F-4D97-AF65-F5344CB8AC3E}">
-        <p14:creationId xmlns:p14="http://schemas.microsoft.com/office/powerpoint/2010/main" val="850536261"/>
+        <p14:creationId xmlns:p14="http://schemas.microsoft.com/office/powerpoint/2010/main" val="112234734"/>
       </p:ext>
     </p:extLst>
   </p:cSld>
@@ -14153,152 +14159,6 @@
           <p:cNvPr id="2" name="Title 1">
             <a:extLst>
               <a:ext uri="{FF2B5EF4-FFF2-40B4-BE49-F238E27FC236}">
-                <a16:creationId xmlns:a16="http://schemas.microsoft.com/office/drawing/2014/main" id="{038C0EC6-8705-B948-9282-63C3BF8214BF}"/>
-              </a:ext>
-            </a:extLst>
-          </p:cNvPr>
-          <p:cNvSpPr>
-            <a:spLocks noGrp="1"/>
-          </p:cNvSpPr>
-          <p:nvPr>
-            <p:ph type="title"/>
-          </p:nvPr>
-        </p:nvSpPr>
-        <p:spPr/>
-        <p:txBody>
-          <a:bodyPr/>
-          <a:lstStyle/>
-          <a:p>
-            <a:r>
-              <a:rPr lang="en-US" dirty="0"/>
-              <a:t>Strongly Connected Components (SCCs)</a:t>
-            </a:r>
-          </a:p>
-        </p:txBody>
-      </p:sp>
-      <p:sp>
-        <p:nvSpPr>
-          <p:cNvPr id="3" name="Content Placeholder 2">
-            <a:extLst>
-              <a:ext uri="{FF2B5EF4-FFF2-40B4-BE49-F238E27FC236}">
-                <a16:creationId xmlns:a16="http://schemas.microsoft.com/office/drawing/2014/main" id="{9B4F21D7-06BD-2C48-94FD-7ED9728D08D9}"/>
-              </a:ext>
-            </a:extLst>
-          </p:cNvPr>
-          <p:cNvSpPr>
-            <a:spLocks noGrp="1"/>
-          </p:cNvSpPr>
-          <p:nvPr>
-            <p:ph idx="1"/>
-          </p:nvPr>
-        </p:nvSpPr>
-        <p:spPr/>
-        <p:txBody>
-          <a:bodyPr/>
-          <a:lstStyle/>
-          <a:p>
-            <a:r>
-              <a:rPr lang="en-US" dirty="0"/>
-              <a:t>In a digraph, Strongly Connected Components (SCCs) are subgraphs where all vertices in each SCC are reachable from one another</a:t>
-            </a:r>
-          </a:p>
-          <a:p>
-            <a:pPr lvl="1"/>
-            <a:r>
-              <a:rPr lang="en-US" dirty="0"/>
-              <a:t>Thus vertices in an SCC are on a directed cycle</a:t>
-            </a:r>
-          </a:p>
-          <a:p>
-            <a:pPr lvl="1"/>
-            <a:r>
-              <a:rPr lang="en-US" dirty="0"/>
-              <a:t>Any vertex not on a directed cycle is an SCC all by itself</a:t>
-            </a:r>
-          </a:p>
-          <a:p>
-            <a:r>
-              <a:rPr lang="en-US" dirty="0"/>
-              <a:t>Common need: decompose a digraph into its SCCs</a:t>
-            </a:r>
-          </a:p>
-          <a:p>
-            <a:pPr lvl="1"/>
-            <a:r>
-              <a:rPr lang="en-US" dirty="0"/>
-              <a:t>Perhaps then operate on each, combine results based on connections between SCCs</a:t>
-            </a:r>
-          </a:p>
-          <a:p>
-            <a:pPr lvl="1"/>
-            <a:endParaRPr lang="en-US" dirty="0"/>
-          </a:p>
-        </p:txBody>
-      </p:sp>
-      <p:sp>
-        <p:nvSpPr>
-          <p:cNvPr id="4" name="Slide Number Placeholder 3">
-            <a:extLst>
-              <a:ext uri="{FF2B5EF4-FFF2-40B4-BE49-F238E27FC236}">
-                <a16:creationId xmlns:a16="http://schemas.microsoft.com/office/drawing/2014/main" id="{B87F8B67-71E5-4344-830D-A1109F662DAF}"/>
-              </a:ext>
-            </a:extLst>
-          </p:cNvPr>
-          <p:cNvSpPr>
-            <a:spLocks noGrp="1"/>
-          </p:cNvSpPr>
-          <p:nvPr>
-            <p:ph type="sldNum" sz="quarter" idx="12"/>
-          </p:nvPr>
-        </p:nvSpPr>
-        <p:spPr/>
-        <p:txBody>
-          <a:bodyPr/>
-          <a:lstStyle/>
-          <a:p>
-            <a:fld id="{86BADE50-950A-4D58-BFB2-FA2C6A8B385D}" type="slidenum">
-              <a:rPr lang="en-US" smtClean="0"/>
-              <a:t>34</a:t>
-            </a:fld>
-            <a:endParaRPr lang="en-US"/>
-          </a:p>
-        </p:txBody>
-      </p:sp>
-    </p:spTree>
-    <p:extLst>
-      <p:ext uri="{BB962C8B-B14F-4D97-AF65-F5344CB8AC3E}">
-        <p14:creationId xmlns:p14="http://schemas.microsoft.com/office/powerpoint/2010/main" val="112234734"/>
-      </p:ext>
-    </p:extLst>
-  </p:cSld>
-  <p:clrMapOvr>
-    <a:masterClrMapping/>
-  </p:clrMapOvr>
-</p:sld>
-</file>
-
-<file path=ppt/slides/slide35.xml><?xml version="1.0" encoding="utf-8"?>
-<p:sld xmlns:a="http://schemas.openxmlformats.org/drawingml/2006/main" xmlns:r="http://schemas.openxmlformats.org/officeDocument/2006/relationships" xmlns:p="http://schemas.openxmlformats.org/presentationml/2006/main">
-  <p:cSld>
-    <p:spTree>
-      <p:nvGrpSpPr>
-        <p:cNvPr id="1" name=""/>
-        <p:cNvGrpSpPr/>
-        <p:nvPr/>
-      </p:nvGrpSpPr>
-      <p:grpSpPr>
-        <a:xfrm>
-          <a:off x="0" y="0"/>
-          <a:ext cx="0" cy="0"/>
-          <a:chOff x="0" y="0"/>
-          <a:chExt cx="0" cy="0"/>
-        </a:xfrm>
-      </p:grpSpPr>
-      <p:sp>
-        <p:nvSpPr>
-          <p:cNvPr id="2" name="Title 1">
-            <a:extLst>
-              <a:ext uri="{FF2B5EF4-FFF2-40B4-BE49-F238E27FC236}">
                 <a16:creationId xmlns:a16="http://schemas.microsoft.com/office/drawing/2014/main" id="{7A784038-F80E-C24F-8FF5-4E3A39318BE8}"/>
               </a:ext>
             </a:extLst>
@@ -14401,7 +14261,7 @@
           <a:p>
             <a:fld id="{86BADE50-950A-4D58-BFB2-FA2C6A8B385D}" type="slidenum">
               <a:rPr lang="en-US" smtClean="0"/>
-              <a:t>35</a:t>
+              <a:t>34</a:t>
             </a:fld>
             <a:endParaRPr lang="en-US"/>
           </a:p>
@@ -14456,7 +14316,7 @@
 </p:sld>
 </file>
 
-<file path=ppt/slides/slide36.xml><?xml version="1.0" encoding="utf-8"?>
+<file path=ppt/slides/slide35.xml><?xml version="1.0" encoding="utf-8"?>
 <p:sld xmlns:a="http://schemas.openxmlformats.org/drawingml/2006/main" xmlns:r="http://schemas.openxmlformats.org/officeDocument/2006/relationships" xmlns:p="http://schemas.openxmlformats.org/presentationml/2006/main">
   <p:cSld>
     <p:spTree>
@@ -14585,7 +14445,7 @@
           <a:p>
             <a:fld id="{86BADE50-950A-4D58-BFB2-FA2C6A8B385D}" type="slidenum">
               <a:rPr lang="en-US" smtClean="0"/>
-              <a:t>36</a:t>
+              <a:t>35</a:t>
             </a:fld>
             <a:endParaRPr lang="en-US"/>
           </a:p>
@@ -14676,6 +14536,283 @@
 </p:sld>
 </file>
 
+<file path=ppt/slides/slide36.xml><?xml version="1.0" encoding="utf-8"?>
+<p:sld xmlns:a="http://schemas.openxmlformats.org/drawingml/2006/main" xmlns:r="http://schemas.openxmlformats.org/officeDocument/2006/relationships" xmlns:p="http://schemas.openxmlformats.org/presentationml/2006/main">
+  <p:cSld>
+    <p:spTree>
+      <p:nvGrpSpPr>
+        <p:cNvPr id="1" name=""/>
+        <p:cNvGrpSpPr/>
+        <p:nvPr/>
+      </p:nvGrpSpPr>
+      <p:grpSpPr>
+        <a:xfrm>
+          <a:off x="0" y="0"/>
+          <a:ext cx="0" cy="0"/>
+          <a:chOff x="0" y="0"/>
+          <a:chExt cx="0" cy="0"/>
+        </a:xfrm>
+      </p:grpSpPr>
+      <p:sp>
+        <p:nvSpPr>
+          <p:cNvPr id="2" name="Title 1">
+            <a:extLst>
+              <a:ext uri="{FF2B5EF4-FFF2-40B4-BE49-F238E27FC236}">
+                <a16:creationId xmlns:a16="http://schemas.microsoft.com/office/drawing/2014/main" id="{379C7C28-FE16-F64A-88D0-80176A3A36A8}"/>
+              </a:ext>
+            </a:extLst>
+          </p:cNvPr>
+          <p:cNvSpPr>
+            <a:spLocks noGrp="1"/>
+          </p:cNvSpPr>
+          <p:nvPr>
+            <p:ph type="title"/>
+          </p:nvPr>
+        </p:nvSpPr>
+        <p:spPr/>
+        <p:txBody>
+          <a:bodyPr/>
+          <a:lstStyle/>
+          <a:p>
+            <a:r>
+              <a:rPr lang="en-US" dirty="0"/>
+              <a:t>How to Decompose Graph into SCCs</a:t>
+            </a:r>
+          </a:p>
+        </p:txBody>
+      </p:sp>
+      <p:sp>
+        <p:nvSpPr>
+          <p:cNvPr id="3" name="Content Placeholder 2">
+            <a:extLst>
+              <a:ext uri="{FF2B5EF4-FFF2-40B4-BE49-F238E27FC236}">
+                <a16:creationId xmlns:a16="http://schemas.microsoft.com/office/drawing/2014/main" id="{EE7CAC8F-CC65-2F41-AAFF-FCAF1827D9E3}"/>
+              </a:ext>
+            </a:extLst>
+          </p:cNvPr>
+          <p:cNvSpPr>
+            <a:spLocks noGrp="1"/>
+          </p:cNvSpPr>
+          <p:nvPr>
+            <p:ph idx="1"/>
+          </p:nvPr>
+        </p:nvSpPr>
+        <p:spPr/>
+        <p:txBody>
+          <a:bodyPr>
+            <a:normAutofit lnSpcReduction="10000"/>
+          </a:bodyPr>
+          <a:lstStyle/>
+          <a:p>
+            <a:r>
+              <a:rPr lang="en-US" dirty="0"/>
+              <a:t>Several algorithms do this using DFS</a:t>
+            </a:r>
+          </a:p>
+          <a:p>
+            <a:r>
+              <a:rPr lang="en-US" dirty="0"/>
+              <a:t>We’ll use CLRS’s choice (by </a:t>
+            </a:r>
+            <a:r>
+              <a:rPr lang="en-US" dirty="0" err="1"/>
+              <a:t>Kosaraju</a:t>
+            </a:r>
+            <a:r>
+              <a:rPr lang="en-US" dirty="0"/>
+              <a:t> and </a:t>
+            </a:r>
+            <a:r>
+              <a:rPr lang="en-US" dirty="0" err="1"/>
+              <a:t>Sharir</a:t>
+            </a:r>
+            <a:r>
+              <a:rPr lang="en-US" dirty="0"/>
+              <a:t>)</a:t>
+            </a:r>
+          </a:p>
+          <a:p>
+            <a:r>
+              <a:rPr lang="en-US" dirty="0"/>
+              <a:t>Algorithm is:</a:t>
+            </a:r>
+          </a:p>
+          <a:p>
+            <a:pPr marL="914400" lvl="1" indent="-514350">
+              <a:buFont typeface="+mj-lt"/>
+              <a:buAutoNum type="arabicPeriod"/>
+            </a:pPr>
+            <a:r>
+              <a:rPr lang="en-US" dirty="0"/>
+              <a:t>Call </a:t>
+            </a:r>
+            <a:r>
+              <a:rPr lang="en-US" i="1" dirty="0"/>
+              <a:t>DFS-sweep(G) </a:t>
+            </a:r>
+            <a:r>
+              <a:rPr lang="en-US" dirty="0"/>
+              <a:t>to find finishing times </a:t>
+            </a:r>
+            <a:r>
+              <a:rPr lang="en-US" i="1" dirty="0" err="1"/>
+              <a:t>u.f</a:t>
+            </a:r>
+            <a:r>
+              <a:rPr lang="en-US" dirty="0"/>
+              <a:t> for each vertex </a:t>
+            </a:r>
+            <a:r>
+              <a:rPr lang="en-US" i="1" dirty="0"/>
+              <a:t>u</a:t>
+            </a:r>
+            <a:r>
+              <a:rPr lang="en-US" dirty="0"/>
+              <a:t> in </a:t>
+            </a:r>
+            <a:r>
+              <a:rPr lang="en-US" i="1" dirty="0"/>
+              <a:t>G</a:t>
+            </a:r>
+            <a:r>
+              <a:rPr lang="en-US" dirty="0"/>
+              <a:t>.</a:t>
+            </a:r>
+          </a:p>
+          <a:p>
+            <a:pPr marL="914400" lvl="1" indent="-514350">
+              <a:buFont typeface="+mj-lt"/>
+              <a:buAutoNum type="arabicPeriod"/>
+            </a:pPr>
+            <a:r>
+              <a:rPr lang="en-US" dirty="0"/>
+              <a:t>Compute </a:t>
+            </a:r>
+            <a:r>
+              <a:rPr lang="en-US" i="1" dirty="0"/>
+              <a:t>G</a:t>
+            </a:r>
+            <a:r>
+              <a:rPr lang="en-US" i="1" baseline="30000" dirty="0"/>
+              <a:t>T</a:t>
+            </a:r>
+            <a:r>
+              <a:rPr lang="en-US" dirty="0"/>
+              <a:t>, the transpose of diagraph </a:t>
+            </a:r>
+            <a:r>
+              <a:rPr lang="en-US" i="1" dirty="0"/>
+              <a:t>G</a:t>
+            </a:r>
+            <a:r>
+              <a:rPr lang="en-US" dirty="0"/>
+              <a:t>.</a:t>
+            </a:r>
+          </a:p>
+          <a:p>
+            <a:pPr marL="800100" lvl="2" indent="0">
+              <a:buNone/>
+            </a:pPr>
+            <a:r>
+              <a:rPr lang="en-US" dirty="0"/>
+              <a:t>		(Reminder: transpose means same nodes, edges reversed.)</a:t>
+            </a:r>
+          </a:p>
+          <a:p>
+            <a:pPr marL="914400" lvl="1" indent="-514350">
+              <a:buFont typeface="+mj-lt"/>
+              <a:buAutoNum type="arabicPeriod"/>
+            </a:pPr>
+            <a:r>
+              <a:rPr lang="en-US" dirty="0"/>
+              <a:t>Call </a:t>
+            </a:r>
+            <a:r>
+              <a:rPr lang="en-US" i="1" dirty="0"/>
+              <a:t>DFS-sweep(G</a:t>
+            </a:r>
+            <a:r>
+              <a:rPr lang="en-US" i="1" baseline="30000" dirty="0"/>
+              <a:t>T</a:t>
+            </a:r>
+            <a:r>
+              <a:rPr lang="en-US" i="1" dirty="0"/>
+              <a:t>) </a:t>
+            </a:r>
+            <a:r>
+              <a:rPr lang="en-US" dirty="0"/>
+              <a:t>but do the recursive calls on nodes in the order of decreasing </a:t>
+            </a:r>
+            <a:r>
+              <a:rPr lang="en-US" i="1" dirty="0" err="1"/>
+              <a:t>u.f</a:t>
+            </a:r>
+            <a:r>
+              <a:rPr lang="en-US" dirty="0"/>
+              <a:t>.  (Start with the vertex with largest finish time,…)</a:t>
+            </a:r>
+          </a:p>
+          <a:p>
+            <a:pPr marL="914400" lvl="1" indent="-514350">
+              <a:buFont typeface="+mj-lt"/>
+              <a:buAutoNum type="arabicPeriod"/>
+            </a:pPr>
+            <a:r>
+              <a:rPr lang="en-US" dirty="0"/>
+              <a:t>The DFS forest produced in Step 3 is the set of SCCs</a:t>
+            </a:r>
+          </a:p>
+          <a:p>
+            <a:pPr marL="914400" lvl="1" indent="-514350">
+              <a:buFont typeface="+mj-lt"/>
+              <a:buAutoNum type="arabicPeriod"/>
+            </a:pPr>
+            <a:endParaRPr lang="en-US" dirty="0"/>
+          </a:p>
+        </p:txBody>
+      </p:sp>
+      <p:sp>
+        <p:nvSpPr>
+          <p:cNvPr id="4" name="Slide Number Placeholder 3">
+            <a:extLst>
+              <a:ext uri="{FF2B5EF4-FFF2-40B4-BE49-F238E27FC236}">
+                <a16:creationId xmlns:a16="http://schemas.microsoft.com/office/drawing/2014/main" id="{D6FC7581-7AC9-C642-A4E2-86264043F1BF}"/>
+              </a:ext>
+            </a:extLst>
+          </p:cNvPr>
+          <p:cNvSpPr>
+            <a:spLocks noGrp="1"/>
+          </p:cNvSpPr>
+          <p:nvPr>
+            <p:ph type="sldNum" sz="quarter" idx="12"/>
+          </p:nvPr>
+        </p:nvSpPr>
+        <p:spPr/>
+        <p:txBody>
+          <a:bodyPr/>
+          <a:lstStyle/>
+          <a:p>
+            <a:fld id="{86BADE50-950A-4D58-BFB2-FA2C6A8B385D}" type="slidenum">
+              <a:rPr lang="en-US" smtClean="0"/>
+              <a:t>36</a:t>
+            </a:fld>
+            <a:endParaRPr lang="en-US"/>
+          </a:p>
+        </p:txBody>
+      </p:sp>
+    </p:spTree>
+    <p:extLst>
+      <p:ext uri="{BB962C8B-B14F-4D97-AF65-F5344CB8AC3E}">
+        <p14:creationId xmlns:p14="http://schemas.microsoft.com/office/powerpoint/2010/main" val="652831892"/>
+      </p:ext>
+    </p:extLst>
+  </p:cSld>
+  <p:clrMapOvr>
+    <a:masterClrMapping/>
+  </p:clrMapOvr>
+</p:sld>
+</file>
+
 <file path=ppt/slides/slide37.xml><?xml version="1.0" encoding="utf-8"?>
 <p:sld xmlns:a="http://schemas.openxmlformats.org/drawingml/2006/main" xmlns:r="http://schemas.openxmlformats.org/officeDocument/2006/relationships" xmlns:p="http://schemas.openxmlformats.org/presentationml/2006/main">
   <p:cSld>
@@ -14698,283 +14835,6 @@
           <p:cNvPr id="2" name="Title 1">
             <a:extLst>
               <a:ext uri="{FF2B5EF4-FFF2-40B4-BE49-F238E27FC236}">
-                <a16:creationId xmlns:a16="http://schemas.microsoft.com/office/drawing/2014/main" id="{379C7C28-FE16-F64A-88D0-80176A3A36A8}"/>
-              </a:ext>
-            </a:extLst>
-          </p:cNvPr>
-          <p:cNvSpPr>
-            <a:spLocks noGrp="1"/>
-          </p:cNvSpPr>
-          <p:nvPr>
-            <p:ph type="title"/>
-          </p:nvPr>
-        </p:nvSpPr>
-        <p:spPr/>
-        <p:txBody>
-          <a:bodyPr/>
-          <a:lstStyle/>
-          <a:p>
-            <a:r>
-              <a:rPr lang="en-US" dirty="0"/>
-              <a:t>How to Decompose Graph into SCCs</a:t>
-            </a:r>
-          </a:p>
-        </p:txBody>
-      </p:sp>
-      <p:sp>
-        <p:nvSpPr>
-          <p:cNvPr id="3" name="Content Placeholder 2">
-            <a:extLst>
-              <a:ext uri="{FF2B5EF4-FFF2-40B4-BE49-F238E27FC236}">
-                <a16:creationId xmlns:a16="http://schemas.microsoft.com/office/drawing/2014/main" id="{EE7CAC8F-CC65-2F41-AAFF-FCAF1827D9E3}"/>
-              </a:ext>
-            </a:extLst>
-          </p:cNvPr>
-          <p:cNvSpPr>
-            <a:spLocks noGrp="1"/>
-          </p:cNvSpPr>
-          <p:nvPr>
-            <p:ph idx="1"/>
-          </p:nvPr>
-        </p:nvSpPr>
-        <p:spPr/>
-        <p:txBody>
-          <a:bodyPr>
-            <a:normAutofit lnSpcReduction="10000"/>
-          </a:bodyPr>
-          <a:lstStyle/>
-          <a:p>
-            <a:r>
-              <a:rPr lang="en-US" dirty="0"/>
-              <a:t>Several algorithms do this using DFS</a:t>
-            </a:r>
-          </a:p>
-          <a:p>
-            <a:r>
-              <a:rPr lang="en-US" dirty="0"/>
-              <a:t>We’ll use CLRS’s choice (by </a:t>
-            </a:r>
-            <a:r>
-              <a:rPr lang="en-US" dirty="0" err="1"/>
-              <a:t>Kosaraju</a:t>
-            </a:r>
-            <a:r>
-              <a:rPr lang="en-US" dirty="0"/>
-              <a:t> and </a:t>
-            </a:r>
-            <a:r>
-              <a:rPr lang="en-US" dirty="0" err="1"/>
-              <a:t>Sharir</a:t>
-            </a:r>
-            <a:r>
-              <a:rPr lang="en-US" dirty="0"/>
-              <a:t>)</a:t>
-            </a:r>
-          </a:p>
-          <a:p>
-            <a:r>
-              <a:rPr lang="en-US" dirty="0"/>
-              <a:t>Algorithm is:</a:t>
-            </a:r>
-          </a:p>
-          <a:p>
-            <a:pPr marL="914400" lvl="1" indent="-514350">
-              <a:buFont typeface="+mj-lt"/>
-              <a:buAutoNum type="arabicPeriod"/>
-            </a:pPr>
-            <a:r>
-              <a:rPr lang="en-US" dirty="0"/>
-              <a:t>Call </a:t>
-            </a:r>
-            <a:r>
-              <a:rPr lang="en-US" i="1" dirty="0"/>
-              <a:t>DFS-sweep(G) </a:t>
-            </a:r>
-            <a:r>
-              <a:rPr lang="en-US" dirty="0"/>
-              <a:t>to find finishing times </a:t>
-            </a:r>
-            <a:r>
-              <a:rPr lang="en-US" i="1" dirty="0" err="1"/>
-              <a:t>u.f</a:t>
-            </a:r>
-            <a:r>
-              <a:rPr lang="en-US" dirty="0"/>
-              <a:t> for each vertex </a:t>
-            </a:r>
-            <a:r>
-              <a:rPr lang="en-US" i="1" dirty="0"/>
-              <a:t>u</a:t>
-            </a:r>
-            <a:r>
-              <a:rPr lang="en-US" dirty="0"/>
-              <a:t> in </a:t>
-            </a:r>
-            <a:r>
-              <a:rPr lang="en-US" i="1" dirty="0"/>
-              <a:t>G</a:t>
-            </a:r>
-            <a:r>
-              <a:rPr lang="en-US" dirty="0"/>
-              <a:t>.</a:t>
-            </a:r>
-          </a:p>
-          <a:p>
-            <a:pPr marL="914400" lvl="1" indent="-514350">
-              <a:buFont typeface="+mj-lt"/>
-              <a:buAutoNum type="arabicPeriod"/>
-            </a:pPr>
-            <a:r>
-              <a:rPr lang="en-US" dirty="0"/>
-              <a:t>Compute </a:t>
-            </a:r>
-            <a:r>
-              <a:rPr lang="en-US" i="1" dirty="0"/>
-              <a:t>G</a:t>
-            </a:r>
-            <a:r>
-              <a:rPr lang="en-US" i="1" baseline="30000" dirty="0"/>
-              <a:t>T</a:t>
-            </a:r>
-            <a:r>
-              <a:rPr lang="en-US" dirty="0"/>
-              <a:t>, the transpose of diagraph </a:t>
-            </a:r>
-            <a:r>
-              <a:rPr lang="en-US" i="1" dirty="0"/>
-              <a:t>G</a:t>
-            </a:r>
-            <a:r>
-              <a:rPr lang="en-US" dirty="0"/>
-              <a:t>.</a:t>
-            </a:r>
-          </a:p>
-          <a:p>
-            <a:pPr marL="800100" lvl="2" indent="0">
-              <a:buNone/>
-            </a:pPr>
-            <a:r>
-              <a:rPr lang="en-US" dirty="0"/>
-              <a:t>		(Reminder: transpose means same nodes, edges reversed.)</a:t>
-            </a:r>
-          </a:p>
-          <a:p>
-            <a:pPr marL="914400" lvl="1" indent="-514350">
-              <a:buFont typeface="+mj-lt"/>
-              <a:buAutoNum type="arabicPeriod"/>
-            </a:pPr>
-            <a:r>
-              <a:rPr lang="en-US" dirty="0"/>
-              <a:t>Call </a:t>
-            </a:r>
-            <a:r>
-              <a:rPr lang="en-US" i="1" dirty="0"/>
-              <a:t>DFS-sweep(G</a:t>
-            </a:r>
-            <a:r>
-              <a:rPr lang="en-US" i="1" baseline="30000" dirty="0"/>
-              <a:t>T</a:t>
-            </a:r>
-            <a:r>
-              <a:rPr lang="en-US" i="1" dirty="0"/>
-              <a:t>) </a:t>
-            </a:r>
-            <a:r>
-              <a:rPr lang="en-US" dirty="0"/>
-              <a:t>but do the recursive calls on nodes in the order of decreasing </a:t>
-            </a:r>
-            <a:r>
-              <a:rPr lang="en-US" i="1" dirty="0" err="1"/>
-              <a:t>u.f</a:t>
-            </a:r>
-            <a:r>
-              <a:rPr lang="en-US" dirty="0"/>
-              <a:t>.  (Start with the vertex with largest finish time,…)</a:t>
-            </a:r>
-          </a:p>
-          <a:p>
-            <a:pPr marL="914400" lvl="1" indent="-514350">
-              <a:buFont typeface="+mj-lt"/>
-              <a:buAutoNum type="arabicPeriod"/>
-            </a:pPr>
-            <a:r>
-              <a:rPr lang="en-US" dirty="0"/>
-              <a:t>The DFS forest produced in Step 3 is the set of SCCs</a:t>
-            </a:r>
-          </a:p>
-          <a:p>
-            <a:pPr marL="914400" lvl="1" indent="-514350">
-              <a:buFont typeface="+mj-lt"/>
-              <a:buAutoNum type="arabicPeriod"/>
-            </a:pPr>
-            <a:endParaRPr lang="en-US" dirty="0"/>
-          </a:p>
-        </p:txBody>
-      </p:sp>
-      <p:sp>
-        <p:nvSpPr>
-          <p:cNvPr id="4" name="Slide Number Placeholder 3">
-            <a:extLst>
-              <a:ext uri="{FF2B5EF4-FFF2-40B4-BE49-F238E27FC236}">
-                <a16:creationId xmlns:a16="http://schemas.microsoft.com/office/drawing/2014/main" id="{D6FC7581-7AC9-C642-A4E2-86264043F1BF}"/>
-              </a:ext>
-            </a:extLst>
-          </p:cNvPr>
-          <p:cNvSpPr>
-            <a:spLocks noGrp="1"/>
-          </p:cNvSpPr>
-          <p:nvPr>
-            <p:ph type="sldNum" sz="quarter" idx="12"/>
-          </p:nvPr>
-        </p:nvSpPr>
-        <p:spPr/>
-        <p:txBody>
-          <a:bodyPr/>
-          <a:lstStyle/>
-          <a:p>
-            <a:fld id="{86BADE50-950A-4D58-BFB2-FA2C6A8B385D}" type="slidenum">
-              <a:rPr lang="en-US" smtClean="0"/>
-              <a:t>37</a:t>
-            </a:fld>
-            <a:endParaRPr lang="en-US"/>
-          </a:p>
-        </p:txBody>
-      </p:sp>
-    </p:spTree>
-    <p:extLst>
-      <p:ext uri="{BB962C8B-B14F-4D97-AF65-F5344CB8AC3E}">
-        <p14:creationId xmlns:p14="http://schemas.microsoft.com/office/powerpoint/2010/main" val="652831892"/>
-      </p:ext>
-    </p:extLst>
-  </p:cSld>
-  <p:clrMapOvr>
-    <a:masterClrMapping/>
-  </p:clrMapOvr>
-</p:sld>
-</file>
-
-<file path=ppt/slides/slide38.xml><?xml version="1.0" encoding="utf-8"?>
-<p:sld xmlns:a="http://schemas.openxmlformats.org/drawingml/2006/main" xmlns:r="http://schemas.openxmlformats.org/officeDocument/2006/relationships" xmlns:p="http://schemas.openxmlformats.org/presentationml/2006/main">
-  <p:cSld>
-    <p:spTree>
-      <p:nvGrpSpPr>
-        <p:cNvPr id="1" name=""/>
-        <p:cNvGrpSpPr/>
-        <p:nvPr/>
-      </p:nvGrpSpPr>
-      <p:grpSpPr>
-        <a:xfrm>
-          <a:off x="0" y="0"/>
-          <a:ext cx="0" cy="0"/>
-          <a:chOff x="0" y="0"/>
-          <a:chExt cx="0" cy="0"/>
-        </a:xfrm>
-      </p:grpSpPr>
-      <p:sp>
-        <p:nvSpPr>
-          <p:cNvPr id="2" name="Title 1">
-            <a:extLst>
-              <a:ext uri="{FF2B5EF4-FFF2-40B4-BE49-F238E27FC236}">
                 <a16:creationId xmlns:a16="http://schemas.microsoft.com/office/drawing/2014/main" id="{7A784038-F80E-C24F-8FF5-4E3A39318BE8}"/>
               </a:ext>
             </a:extLst>
@@ -15129,7 +14989,7 @@
           <a:p>
             <a:fld id="{86BADE50-950A-4D58-BFB2-FA2C6A8B385D}" type="slidenum">
               <a:rPr lang="en-US" smtClean="0"/>
-              <a:t>38</a:t>
+              <a:t>37</a:t>
             </a:fld>
             <a:endParaRPr lang="en-US"/>
           </a:p>
@@ -15220,7 +15080,7 @@
 </p:sld>
 </file>
 
-<file path=ppt/slides/slide39.xml><?xml version="1.0" encoding="utf-8"?>
+<file path=ppt/slides/slide38.xml><?xml version="1.0" encoding="utf-8"?>
 <p:sld xmlns:a="http://schemas.openxmlformats.org/drawingml/2006/main" xmlns:r="http://schemas.openxmlformats.org/officeDocument/2006/relationships" xmlns:p="http://schemas.openxmlformats.org/presentationml/2006/main">
   <p:cSld>
     <p:spTree>
@@ -15366,7 +15226,7 @@
           <a:p>
             <a:fld id="{86BADE50-950A-4D58-BFB2-FA2C6A8B385D}" type="slidenum">
               <a:rPr lang="en-US" smtClean="0"/>
-              <a:t>39</a:t>
+              <a:t>38</a:t>
             </a:fld>
             <a:endParaRPr lang="en-US"/>
           </a:p>
@@ -15500,7 +15360,7 @@
 </p:sld>
 </file>
 
-<file path=ppt/slides/slide4.xml><?xml version="1.0" encoding="utf-8"?>
+<file path=ppt/slides/slide39.xml><?xml version="1.0" encoding="utf-8"?>
 <p:sld xmlns:a="http://schemas.openxmlformats.org/drawingml/2006/main" xmlns:r="http://schemas.openxmlformats.org/officeDocument/2006/relationships" xmlns:p="http://schemas.openxmlformats.org/presentationml/2006/main">
   <p:cSld>
     <p:spTree>
@@ -15519,113 +15379,6 @@
       </p:grpSpPr>
       <p:sp>
         <p:nvSpPr>
-          <p:cNvPr id="2" name="Title 1"/>
-          <p:cNvSpPr>
-            <a:spLocks noGrp="1"/>
-          </p:cNvSpPr>
-          <p:nvPr>
-            <p:ph type="ctrTitle"/>
-          </p:nvPr>
-        </p:nvSpPr>
-        <p:spPr/>
-        <p:txBody>
-          <a:bodyPr>
-            <a:normAutofit/>
-          </a:bodyPr>
-          <a:lstStyle/>
-          <a:p>
-            <a:r>
-              <a:rPr lang="en-US" dirty="0"/>
-              <a:t>DFS</a:t>
-            </a:r>
-          </a:p>
-        </p:txBody>
-      </p:sp>
-      <p:sp>
-        <p:nvSpPr>
-          <p:cNvPr id="3" name="Subtitle 2"/>
-          <p:cNvSpPr>
-            <a:spLocks noGrp="1"/>
-          </p:cNvSpPr>
-          <p:nvPr>
-            <p:ph type="subTitle" idx="1"/>
-          </p:nvPr>
-        </p:nvSpPr>
-        <p:spPr/>
-        <p:txBody>
-          <a:bodyPr/>
-          <a:lstStyle/>
-          <a:p>
-            <a:r>
-              <a:rPr lang="en-US" dirty="0"/>
-              <a:t>CLRS Section 22.3 on DFS</a:t>
-            </a:r>
-          </a:p>
-          <a:p>
-            <a:endParaRPr lang="en-US" dirty="0"/>
-          </a:p>
-        </p:txBody>
-      </p:sp>
-      <p:sp>
-        <p:nvSpPr>
-          <p:cNvPr id="4" name="Slide Number Placeholder 3"/>
-          <p:cNvSpPr>
-            <a:spLocks noGrp="1"/>
-          </p:cNvSpPr>
-          <p:nvPr>
-            <p:ph type="sldNum" sz="quarter" idx="12"/>
-          </p:nvPr>
-        </p:nvSpPr>
-        <p:spPr>
-          <a:prstGeom prst="rect">
-            <a:avLst/>
-          </a:prstGeom>
-        </p:spPr>
-        <p:txBody>
-          <a:bodyPr/>
-          <a:lstStyle/>
-          <a:p>
-            <a:fld id="{DACC1BBE-66B1-403A-8C7E-C57A0F3A107F}" type="slidenum">
-              <a:rPr lang="en-US" smtClean="0"/>
-              <a:pPr/>
-              <a:t>4</a:t>
-            </a:fld>
-            <a:endParaRPr lang="en-US"/>
-          </a:p>
-        </p:txBody>
-      </p:sp>
-    </p:spTree>
-    <p:extLst>
-      <p:ext uri="{BB962C8B-B14F-4D97-AF65-F5344CB8AC3E}">
-        <p14:creationId xmlns:p14="http://schemas.microsoft.com/office/powerpoint/2010/main" val="2361054274"/>
-      </p:ext>
-    </p:extLst>
-  </p:cSld>
-  <p:clrMapOvr>
-    <a:masterClrMapping/>
-  </p:clrMapOvr>
-</p:sld>
-</file>
-
-<file path=ppt/slides/slide40.xml><?xml version="1.0" encoding="utf-8"?>
-<p:sld xmlns:a="http://schemas.openxmlformats.org/drawingml/2006/main" xmlns:r="http://schemas.openxmlformats.org/officeDocument/2006/relationships" xmlns:p="http://schemas.openxmlformats.org/presentationml/2006/main">
-  <p:cSld>
-    <p:spTree>
-      <p:nvGrpSpPr>
-        <p:cNvPr id="1" name=""/>
-        <p:cNvGrpSpPr/>
-        <p:nvPr/>
-      </p:nvGrpSpPr>
-      <p:grpSpPr>
-        <a:xfrm>
-          <a:off x="0" y="0"/>
-          <a:ext cx="0" cy="0"/>
-          <a:chOff x="0" y="0"/>
-          <a:chExt cx="0" cy="0"/>
-        </a:xfrm>
-      </p:grpSpPr>
-      <p:sp>
-        <p:nvSpPr>
           <p:cNvPr id="2" name="Title 1">
             <a:extLst>
               <a:ext uri="{FF2B5EF4-FFF2-40B4-BE49-F238E27FC236}">
@@ -15757,7 +15510,7 @@
           <a:p>
             <a:fld id="{86BADE50-950A-4D58-BFB2-FA2C6A8B385D}" type="slidenum">
               <a:rPr lang="en-US" smtClean="0"/>
-              <a:t>40</a:t>
+              <a:t>39</a:t>
             </a:fld>
             <a:endParaRPr lang="en-US"/>
           </a:p>
@@ -15891,7 +15644,7 @@
 </p:sld>
 </file>
 
-<file path=ppt/slides/slide41.xml><?xml version="1.0" encoding="utf-8"?>
+<file path=ppt/slides/slide4.xml><?xml version="1.0" encoding="utf-8"?>
 <p:sld xmlns:a="http://schemas.openxmlformats.org/drawingml/2006/main" xmlns:r="http://schemas.openxmlformats.org/officeDocument/2006/relationships" xmlns:p="http://schemas.openxmlformats.org/presentationml/2006/main">
   <p:cSld>
     <p:spTree>
@@ -15910,6 +15663,113 @@
       </p:grpSpPr>
       <p:sp>
         <p:nvSpPr>
+          <p:cNvPr id="2" name="Title 1"/>
+          <p:cNvSpPr>
+            <a:spLocks noGrp="1"/>
+          </p:cNvSpPr>
+          <p:nvPr>
+            <p:ph type="ctrTitle"/>
+          </p:nvPr>
+        </p:nvSpPr>
+        <p:spPr/>
+        <p:txBody>
+          <a:bodyPr>
+            <a:normAutofit/>
+          </a:bodyPr>
+          <a:lstStyle/>
+          <a:p>
+            <a:r>
+              <a:rPr lang="en-US" dirty="0"/>
+              <a:t>DFS</a:t>
+            </a:r>
+          </a:p>
+        </p:txBody>
+      </p:sp>
+      <p:sp>
+        <p:nvSpPr>
+          <p:cNvPr id="3" name="Subtitle 2"/>
+          <p:cNvSpPr>
+            <a:spLocks noGrp="1"/>
+          </p:cNvSpPr>
+          <p:nvPr>
+            <p:ph type="subTitle" idx="1"/>
+          </p:nvPr>
+        </p:nvSpPr>
+        <p:spPr/>
+        <p:txBody>
+          <a:bodyPr/>
+          <a:lstStyle/>
+          <a:p>
+            <a:r>
+              <a:rPr lang="en-US" dirty="0"/>
+              <a:t>CLRS Section 22.3 on DFS</a:t>
+            </a:r>
+          </a:p>
+          <a:p>
+            <a:endParaRPr lang="en-US" dirty="0"/>
+          </a:p>
+        </p:txBody>
+      </p:sp>
+      <p:sp>
+        <p:nvSpPr>
+          <p:cNvPr id="4" name="Slide Number Placeholder 3"/>
+          <p:cNvSpPr>
+            <a:spLocks noGrp="1"/>
+          </p:cNvSpPr>
+          <p:nvPr>
+            <p:ph type="sldNum" sz="quarter" idx="12"/>
+          </p:nvPr>
+        </p:nvSpPr>
+        <p:spPr>
+          <a:prstGeom prst="rect">
+            <a:avLst/>
+          </a:prstGeom>
+        </p:spPr>
+        <p:txBody>
+          <a:bodyPr/>
+          <a:lstStyle/>
+          <a:p>
+            <a:fld id="{DACC1BBE-66B1-403A-8C7E-C57A0F3A107F}" type="slidenum">
+              <a:rPr lang="en-US" smtClean="0"/>
+              <a:pPr/>
+              <a:t>4</a:t>
+            </a:fld>
+            <a:endParaRPr lang="en-US"/>
+          </a:p>
+        </p:txBody>
+      </p:sp>
+    </p:spTree>
+    <p:extLst>
+      <p:ext uri="{BB962C8B-B14F-4D97-AF65-F5344CB8AC3E}">
+        <p14:creationId xmlns:p14="http://schemas.microsoft.com/office/powerpoint/2010/main" val="2361054274"/>
+      </p:ext>
+    </p:extLst>
+  </p:cSld>
+  <p:clrMapOvr>
+    <a:masterClrMapping/>
+  </p:clrMapOvr>
+</p:sld>
+</file>
+
+<file path=ppt/slides/slide40.xml><?xml version="1.0" encoding="utf-8"?>
+<p:sld xmlns:a="http://schemas.openxmlformats.org/drawingml/2006/main" xmlns:r="http://schemas.openxmlformats.org/officeDocument/2006/relationships" xmlns:p="http://schemas.openxmlformats.org/presentationml/2006/main">
+  <p:cSld>
+    <p:spTree>
+      <p:nvGrpSpPr>
+        <p:cNvPr id="1" name=""/>
+        <p:cNvGrpSpPr/>
+        <p:nvPr/>
+      </p:nvGrpSpPr>
+      <p:grpSpPr>
+        <a:xfrm>
+          <a:off x="0" y="0"/>
+          <a:ext cx="0" cy="0"/>
+          <a:chOff x="0" y="0"/>
+          <a:chExt cx="0" cy="0"/>
+        </a:xfrm>
+      </p:grpSpPr>
+      <p:sp>
+        <p:nvSpPr>
           <p:cNvPr id="2" name="Title 1">
             <a:extLst>
               <a:ext uri="{FF2B5EF4-FFF2-40B4-BE49-F238E27FC236}">
@@ -16018,7 +15878,7 @@
           <a:p>
             <a:fld id="{86BADE50-950A-4D58-BFB2-FA2C6A8B385D}" type="slidenum">
               <a:rPr lang="en-US" smtClean="0"/>
-              <a:t>41</a:t>
+              <a:t>40</a:t>
             </a:fld>
             <a:endParaRPr lang="en-US"/>
           </a:p>
@@ -16109,7 +15969,7 @@
 </p:sld>
 </file>
 
-<file path=ppt/slides/slide42.xml><?xml version="1.0" encoding="utf-8"?>
+<file path=ppt/slides/slide41.xml><?xml version="1.0" encoding="utf-8"?>
 <p:sld xmlns:a="http://schemas.openxmlformats.org/drawingml/2006/main" xmlns:r="http://schemas.openxmlformats.org/officeDocument/2006/relationships" xmlns:p="http://schemas.openxmlformats.org/presentationml/2006/main">
   <p:cSld>
     <p:spTree>
@@ -16238,7 +16098,7 @@
           <a:p>
             <a:fld id="{86BADE50-950A-4D58-BFB2-FA2C6A8B385D}" type="slidenum">
               <a:rPr lang="en-US" smtClean="0"/>
-              <a:t>42</a:t>
+              <a:t>41</a:t>
             </a:fld>
             <a:endParaRPr lang="en-US"/>
           </a:p>
@@ -17469,18 +17329,6 @@
 </file>
 
 <file path=ppt/tags/tag55.xml><?xml version="1.0" encoding="utf-8"?>
-<p:tagLst xmlns:a="http://schemas.openxmlformats.org/drawingml/2006/main" xmlns:r="http://schemas.openxmlformats.org/officeDocument/2006/relationships" xmlns:p="http://schemas.openxmlformats.org/presentationml/2006/main">
-  <p:tag name="_INSTRUCTOR VIEW19C14C36-AC8E-43BC-9DB6-C2AAF774C7DC|PANE__TAG" val="_"/>
-</p:tagLst>
-</file>
-
-<file path=ppt/tags/tag56.xml><?xml version="1.0" encoding="utf-8"?>
-<p:tagLst xmlns:a="http://schemas.openxmlformats.org/drawingml/2006/main" xmlns:r="http://schemas.openxmlformats.org/officeDocument/2006/relationships" xmlns:p="http://schemas.openxmlformats.org/presentationml/2006/main">
-  <p:tag name="_INSTRUCTOR VIEW19C14C36-AC8E-43BC-9DB6-C2AAF774C7DC|PANE__TAG" val="_"/>
-</p:tagLst>
-</file>
-
-<file path=ppt/tags/tag57.xml><?xml version="1.0" encoding="utf-8"?>
 <p:tagLst xmlns:a="http://schemas.openxmlformats.org/drawingml/2006/main" xmlns:r="http://schemas.openxmlformats.org/officeDocument/2006/relationships" xmlns:p="http://schemas.openxmlformats.org/presentationml/2006/main">
   <p:tag name="_INSTRUCTOR VIEW19C14C36-AC8E-43BC-9DB6-C2AAF774C7DC|PANE__TAG" val="_"/>
 </p:tagLst>

</xml_diff>

<commit_message>
a bunch of homework
</commit_message>
<xml_diff>
--- a/slides/01-02-GraphsDFSTopoSCC.pptx
+++ b/slides/01-02-GraphsDFSTopoSCC.pptx
@@ -248,7 +248,7 @@
           <a:p>
             <a:fld id="{9A9F7FD5-2840-4607-A4CD-0A8A66D9D61D}" type="datetimeFigureOut">
               <a:rPr lang="en-US" smtClean="0"/>
-              <a:t>8/31/22</a:t>
+              <a:t>9/2/22</a:t>
             </a:fld>
             <a:endParaRPr lang="en-US"/>
           </a:p>
@@ -773,7 +773,7 @@
           <a:p>
             <a:fld id="{088A2421-D2CD-4522-A1BA-E4F59ED821B7}" type="datetime1">
               <a:rPr lang="en-US" smtClean="0"/>
-              <a:t>8/31/22</a:t>
+              <a:t>9/2/22</a:t>
             </a:fld>
             <a:endParaRPr lang="en-US"/>
           </a:p>
@@ -1048,7 +1048,7 @@
           <a:p>
             <a:fld id="{DA91928D-0C55-4D8D-9D16-4C05754E5356}" type="datetime1">
               <a:rPr lang="en-US" smtClean="0"/>
-              <a:t>8/31/22</a:t>
+              <a:t>9/2/22</a:t>
             </a:fld>
             <a:endParaRPr lang="en-US"/>
           </a:p>
@@ -1303,7 +1303,7 @@
           <a:p>
             <a:fld id="{584CEDDD-253B-4C38-A621-35D8BA950C17}" type="datetime1">
               <a:rPr lang="en-US" smtClean="0"/>
-              <a:t>8/31/22</a:t>
+              <a:t>9/2/22</a:t>
             </a:fld>
             <a:endParaRPr lang="en-US"/>
           </a:p>
@@ -1471,7 +1471,7 @@
           <a:p>
             <a:fld id="{BF0967E4-28CB-45C9-B82C-D6B22AD4F0EB}" type="datetime1">
               <a:rPr lang="en-US" smtClean="0"/>
-              <a:t>8/31/22</a:t>
+              <a:t>9/2/22</a:t>
             </a:fld>
             <a:endParaRPr lang="en-US"/>
           </a:p>
@@ -1649,7 +1649,7 @@
           <a:p>
             <a:fld id="{2454C693-B405-44E1-A127-B7CE8B45C1E1}" type="datetime1">
               <a:rPr lang="en-US" smtClean="0"/>
-              <a:t>8/31/22</a:t>
+              <a:t>9/2/22</a:t>
             </a:fld>
             <a:endParaRPr lang="en-US"/>
           </a:p>
@@ -1901,7 +1901,7 @@
           <a:p>
             <a:fld id="{26B28102-2E91-4DD7-8E8B-98B790A12701}" type="datetime1">
               <a:rPr lang="en-US" smtClean="0"/>
-              <a:t>8/31/22</a:t>
+              <a:t>9/2/22</a:t>
             </a:fld>
             <a:endParaRPr lang="en-US"/>
           </a:p>
@@ -2159,7 +2159,7 @@
           <a:p>
             <a:fld id="{0B5AF985-6D44-417A-9881-D208468CBA07}" type="datetime1">
               <a:rPr lang="en-US" smtClean="0"/>
-              <a:t>8/31/22</a:t>
+              <a:t>9/2/22</a:t>
             </a:fld>
             <a:endParaRPr lang="en-US"/>
           </a:p>
@@ -2416,7 +2416,7 @@
           <a:p>
             <a:fld id="{26B28102-2E91-4DD7-8E8B-98B790A12701}" type="datetime1">
               <a:rPr lang="en-US" smtClean="0"/>
-              <a:t>8/31/22</a:t>
+              <a:t>9/2/22</a:t>
             </a:fld>
             <a:endParaRPr lang="en-US"/>
           </a:p>
@@ -2662,7 +2662,7 @@
           <a:p>
             <a:fld id="{3A604A86-E8D2-4E57-8D6D-61E2D175474B}" type="datetime1">
               <a:rPr lang="en-US" smtClean="0"/>
-              <a:t>8/31/22</a:t>
+              <a:t>9/2/22</a:t>
             </a:fld>
             <a:endParaRPr lang="en-US"/>
           </a:p>
@@ -3025,7 +3025,7 @@
           <a:p>
             <a:fld id="{DC921DF3-1FB0-45DC-97EF-461960E13574}" type="datetime1">
               <a:rPr lang="en-US" smtClean="0"/>
-              <a:t>8/31/22</a:t>
+              <a:t>9/2/22</a:t>
             </a:fld>
             <a:endParaRPr lang="en-US"/>
           </a:p>
@@ -3517,7 +3517,7 @@
           <a:p>
             <a:fld id="{092B088E-2809-46D8-B43F-738015D878CC}" type="datetime1">
               <a:rPr lang="en-US" smtClean="0"/>
-              <a:t>8/31/22</a:t>
+              <a:t>9/2/22</a:t>
             </a:fld>
             <a:endParaRPr lang="en-US"/>
           </a:p>
@@ -3712,7 +3712,7 @@
           <a:p>
             <a:fld id="{8208D42A-BC08-426E-9E11-483BA9D61AF6}" type="datetime1">
               <a:rPr lang="en-US" smtClean="0"/>
-              <a:t>8/31/22</a:t>
+              <a:t>9/2/22</a:t>
             </a:fld>
             <a:endParaRPr lang="en-US"/>
           </a:p>
@@ -3912,7 +3912,7 @@
           <a:p>
             <a:fld id="{26B28102-2E91-4DD7-8E8B-98B790A12701}" type="datetime1">
               <a:rPr lang="en-US" smtClean="0"/>
-              <a:t>8/31/22</a:t>
+              <a:t>9/2/22</a:t>
             </a:fld>
             <a:endParaRPr lang="en-US"/>
           </a:p>
@@ -4008,7 +4008,7 @@
           <a:p>
             <a:fld id="{37D5C786-44E1-4BD5-AD14-75F3EA166B5A}" type="datetime1">
               <a:rPr lang="en-US" smtClean="0"/>
-              <a:t>8/31/22</a:t>
+              <a:t>9/2/22</a:t>
             </a:fld>
             <a:endParaRPr lang="en-US"/>
           </a:p>
@@ -4219,7 +4219,7 @@
           <a:p>
             <a:fld id="{26B28102-2E91-4DD7-8E8B-98B790A12701}" type="datetime1">
               <a:rPr lang="en-US" smtClean="0"/>
-              <a:t>8/31/22</a:t>
+              <a:t>9/2/22</a:t>
             </a:fld>
             <a:endParaRPr lang="en-US"/>
           </a:p>
@@ -11111,14 +11111,14 @@
           </a:ln>
           <a:extLst>
             <a:ext uri="{909E8E84-426E-40dd-AFC4-6F175D3DCCD1}">
-              <a14:hiddenFill xmlns="" xmlns:a14="http://schemas.microsoft.com/office/drawing/2010/main">
+              <a14:hiddenFill xmlns:a14="http://schemas.microsoft.com/office/drawing/2010/main" xmlns="">
                 <a:solidFill>
                   <a:srgbClr val="FFFFFF"/>
                 </a:solidFill>
               </a14:hiddenFill>
             </a:ext>
             <a:ext uri="{91240B29-F687-4f45-9708-019B960494DF}">
-              <a14:hiddenLine xmlns="" xmlns:a14="http://schemas.microsoft.com/office/drawing/2010/main" w="9525">
+              <a14:hiddenLine xmlns:a14="http://schemas.microsoft.com/office/drawing/2010/main" xmlns="" w="9525">
                 <a:solidFill>
                   <a:srgbClr val="000000"/>
                 </a:solidFill>

</xml_diff>

<commit_message>
adding ta bio page
</commit_message>
<xml_diff>
--- a/slides/01-02-GraphsDFSTopoSCC.pptx
+++ b/slides/01-02-GraphsDFSTopoSCC.pptx
@@ -248,7 +248,7 @@
           <a:p>
             <a:fld id="{9A9F7FD5-2840-4607-A4CD-0A8A66D9D61D}" type="datetimeFigureOut">
               <a:rPr lang="en-US" smtClean="0"/>
-              <a:t>9/2/22</a:t>
+              <a:t>9/5/22</a:t>
             </a:fld>
             <a:endParaRPr lang="en-US"/>
           </a:p>
@@ -773,7 +773,7 @@
           <a:p>
             <a:fld id="{088A2421-D2CD-4522-A1BA-E4F59ED821B7}" type="datetime1">
               <a:rPr lang="en-US" smtClean="0"/>
-              <a:t>9/2/22</a:t>
+              <a:t>9/5/22</a:t>
             </a:fld>
             <a:endParaRPr lang="en-US"/>
           </a:p>
@@ -1048,7 +1048,7 @@
           <a:p>
             <a:fld id="{DA91928D-0C55-4D8D-9D16-4C05754E5356}" type="datetime1">
               <a:rPr lang="en-US" smtClean="0"/>
-              <a:t>9/2/22</a:t>
+              <a:t>9/5/22</a:t>
             </a:fld>
             <a:endParaRPr lang="en-US"/>
           </a:p>
@@ -1303,7 +1303,7 @@
           <a:p>
             <a:fld id="{584CEDDD-253B-4C38-A621-35D8BA950C17}" type="datetime1">
               <a:rPr lang="en-US" smtClean="0"/>
-              <a:t>9/2/22</a:t>
+              <a:t>9/5/22</a:t>
             </a:fld>
             <a:endParaRPr lang="en-US"/>
           </a:p>
@@ -1471,7 +1471,7 @@
           <a:p>
             <a:fld id="{BF0967E4-28CB-45C9-B82C-D6B22AD4F0EB}" type="datetime1">
               <a:rPr lang="en-US" smtClean="0"/>
-              <a:t>9/2/22</a:t>
+              <a:t>9/5/22</a:t>
             </a:fld>
             <a:endParaRPr lang="en-US"/>
           </a:p>
@@ -1649,7 +1649,7 @@
           <a:p>
             <a:fld id="{2454C693-B405-44E1-A127-B7CE8B45C1E1}" type="datetime1">
               <a:rPr lang="en-US" smtClean="0"/>
-              <a:t>9/2/22</a:t>
+              <a:t>9/5/22</a:t>
             </a:fld>
             <a:endParaRPr lang="en-US"/>
           </a:p>
@@ -1901,7 +1901,7 @@
           <a:p>
             <a:fld id="{26B28102-2E91-4DD7-8E8B-98B790A12701}" type="datetime1">
               <a:rPr lang="en-US" smtClean="0"/>
-              <a:t>9/2/22</a:t>
+              <a:t>9/5/22</a:t>
             </a:fld>
             <a:endParaRPr lang="en-US"/>
           </a:p>
@@ -2159,7 +2159,7 @@
           <a:p>
             <a:fld id="{0B5AF985-6D44-417A-9881-D208468CBA07}" type="datetime1">
               <a:rPr lang="en-US" smtClean="0"/>
-              <a:t>9/2/22</a:t>
+              <a:t>9/5/22</a:t>
             </a:fld>
             <a:endParaRPr lang="en-US"/>
           </a:p>
@@ -2416,7 +2416,7 @@
           <a:p>
             <a:fld id="{26B28102-2E91-4DD7-8E8B-98B790A12701}" type="datetime1">
               <a:rPr lang="en-US" smtClean="0"/>
-              <a:t>9/2/22</a:t>
+              <a:t>9/5/22</a:t>
             </a:fld>
             <a:endParaRPr lang="en-US"/>
           </a:p>
@@ -2662,7 +2662,7 @@
           <a:p>
             <a:fld id="{3A604A86-E8D2-4E57-8D6D-61E2D175474B}" type="datetime1">
               <a:rPr lang="en-US" smtClean="0"/>
-              <a:t>9/2/22</a:t>
+              <a:t>9/5/22</a:t>
             </a:fld>
             <a:endParaRPr lang="en-US"/>
           </a:p>
@@ -3025,7 +3025,7 @@
           <a:p>
             <a:fld id="{DC921DF3-1FB0-45DC-97EF-461960E13574}" type="datetime1">
               <a:rPr lang="en-US" smtClean="0"/>
-              <a:t>9/2/22</a:t>
+              <a:t>9/5/22</a:t>
             </a:fld>
             <a:endParaRPr lang="en-US"/>
           </a:p>
@@ -3517,7 +3517,7 @@
           <a:p>
             <a:fld id="{092B088E-2809-46D8-B43F-738015D878CC}" type="datetime1">
               <a:rPr lang="en-US" smtClean="0"/>
-              <a:t>9/2/22</a:t>
+              <a:t>9/5/22</a:t>
             </a:fld>
             <a:endParaRPr lang="en-US"/>
           </a:p>
@@ -3712,7 +3712,7 @@
           <a:p>
             <a:fld id="{8208D42A-BC08-426E-9E11-483BA9D61AF6}" type="datetime1">
               <a:rPr lang="en-US" smtClean="0"/>
-              <a:t>9/2/22</a:t>
+              <a:t>9/5/22</a:t>
             </a:fld>
             <a:endParaRPr lang="en-US"/>
           </a:p>
@@ -3912,7 +3912,7 @@
           <a:p>
             <a:fld id="{26B28102-2E91-4DD7-8E8B-98B790A12701}" type="datetime1">
               <a:rPr lang="en-US" smtClean="0"/>
-              <a:t>9/2/22</a:t>
+              <a:t>9/5/22</a:t>
             </a:fld>
             <a:endParaRPr lang="en-US"/>
           </a:p>
@@ -4008,7 +4008,7 @@
           <a:p>
             <a:fld id="{37D5C786-44E1-4BD5-AD14-75F3EA166B5A}" type="datetime1">
               <a:rPr lang="en-US" smtClean="0"/>
-              <a:t>9/2/22</a:t>
+              <a:t>9/5/22</a:t>
             </a:fld>
             <a:endParaRPr lang="en-US"/>
           </a:p>
@@ -4219,7 +4219,7 @@
           <a:p>
             <a:fld id="{26B28102-2E91-4DD7-8E8B-98B790A12701}" type="datetime1">
               <a:rPr lang="en-US" smtClean="0"/>
-              <a:t>9/2/22</a:t>
+              <a:t>9/5/22</a:t>
             </a:fld>
             <a:endParaRPr lang="en-US"/>
           </a:p>
@@ -11111,14 +11111,14 @@
           </a:ln>
           <a:extLst>
             <a:ext uri="{909E8E84-426E-40dd-AFC4-6F175D3DCCD1}">
-              <a14:hiddenFill xmlns:a14="http://schemas.microsoft.com/office/drawing/2010/main" xmlns="">
+              <a14:hiddenFill xmlns="" xmlns:a14="http://schemas.microsoft.com/office/drawing/2010/main">
                 <a:solidFill>
                   <a:srgbClr val="FFFFFF"/>
                 </a:solidFill>
               </a14:hiddenFill>
             </a:ext>
             <a:ext uri="{91240B29-F687-4f45-9708-019B960494DF}">
-              <a14:hiddenLine xmlns:a14="http://schemas.microsoft.com/office/drawing/2010/main" xmlns="" w="9525">
+              <a14:hiddenLine xmlns="" xmlns:a14="http://schemas.microsoft.com/office/drawing/2010/main" w="9525">
                 <a:solidFill>
                   <a:srgbClr val="000000"/>
                 </a:solidFill>
@@ -14698,7 +14698,7 @@
             </a:r>
             <a:r>
               <a:rPr lang="en-US" dirty="0"/>
-              <a:t>, the transpose of diagraph </a:t>
+              <a:t>, the transpose of digraph </a:t>
             </a:r>
             <a:r>
               <a:rPr lang="en-US" i="1" dirty="0"/>

</xml_diff>

<commit_message>
adding resource division slides
</commit_message>
<xml_diff>
--- a/slides/01-02-GraphsDFSTopoSCC.pptx
+++ b/slides/01-02-GraphsDFSTopoSCC.pptx
@@ -248,7 +248,7 @@
           <a:p>
             <a:fld id="{9A9F7FD5-2840-4607-A4CD-0A8A66D9D61D}" type="datetimeFigureOut">
               <a:rPr lang="en-US" smtClean="0"/>
-              <a:t>9/5/22</a:t>
+              <a:t>10/19/22</a:t>
             </a:fld>
             <a:endParaRPr lang="en-US"/>
           </a:p>
@@ -773,7 +773,7 @@
           <a:p>
             <a:fld id="{088A2421-D2CD-4522-A1BA-E4F59ED821B7}" type="datetime1">
               <a:rPr lang="en-US" smtClean="0"/>
-              <a:t>9/5/22</a:t>
+              <a:t>10/19/22</a:t>
             </a:fld>
             <a:endParaRPr lang="en-US"/>
           </a:p>
@@ -1048,7 +1048,7 @@
           <a:p>
             <a:fld id="{DA91928D-0C55-4D8D-9D16-4C05754E5356}" type="datetime1">
               <a:rPr lang="en-US" smtClean="0"/>
-              <a:t>9/5/22</a:t>
+              <a:t>10/19/22</a:t>
             </a:fld>
             <a:endParaRPr lang="en-US"/>
           </a:p>
@@ -1303,7 +1303,7 @@
           <a:p>
             <a:fld id="{584CEDDD-253B-4C38-A621-35D8BA950C17}" type="datetime1">
               <a:rPr lang="en-US" smtClean="0"/>
-              <a:t>9/5/22</a:t>
+              <a:t>10/19/22</a:t>
             </a:fld>
             <a:endParaRPr lang="en-US"/>
           </a:p>
@@ -1471,7 +1471,7 @@
           <a:p>
             <a:fld id="{BF0967E4-28CB-45C9-B82C-D6B22AD4F0EB}" type="datetime1">
               <a:rPr lang="en-US" smtClean="0"/>
-              <a:t>9/5/22</a:t>
+              <a:t>10/19/22</a:t>
             </a:fld>
             <a:endParaRPr lang="en-US"/>
           </a:p>
@@ -1649,7 +1649,7 @@
           <a:p>
             <a:fld id="{2454C693-B405-44E1-A127-B7CE8B45C1E1}" type="datetime1">
               <a:rPr lang="en-US" smtClean="0"/>
-              <a:t>9/5/22</a:t>
+              <a:t>10/19/22</a:t>
             </a:fld>
             <a:endParaRPr lang="en-US"/>
           </a:p>
@@ -1901,7 +1901,7 @@
           <a:p>
             <a:fld id="{26B28102-2E91-4DD7-8E8B-98B790A12701}" type="datetime1">
               <a:rPr lang="en-US" smtClean="0"/>
-              <a:t>9/5/22</a:t>
+              <a:t>10/19/22</a:t>
             </a:fld>
             <a:endParaRPr lang="en-US"/>
           </a:p>
@@ -2159,7 +2159,7 @@
           <a:p>
             <a:fld id="{0B5AF985-6D44-417A-9881-D208468CBA07}" type="datetime1">
               <a:rPr lang="en-US" smtClean="0"/>
-              <a:t>9/5/22</a:t>
+              <a:t>10/19/22</a:t>
             </a:fld>
             <a:endParaRPr lang="en-US"/>
           </a:p>
@@ -2416,7 +2416,7 @@
           <a:p>
             <a:fld id="{26B28102-2E91-4DD7-8E8B-98B790A12701}" type="datetime1">
               <a:rPr lang="en-US" smtClean="0"/>
-              <a:t>9/5/22</a:t>
+              <a:t>10/19/22</a:t>
             </a:fld>
             <a:endParaRPr lang="en-US"/>
           </a:p>
@@ -2662,7 +2662,7 @@
           <a:p>
             <a:fld id="{3A604A86-E8D2-4E57-8D6D-61E2D175474B}" type="datetime1">
               <a:rPr lang="en-US" smtClean="0"/>
-              <a:t>9/5/22</a:t>
+              <a:t>10/19/22</a:t>
             </a:fld>
             <a:endParaRPr lang="en-US"/>
           </a:p>
@@ -3025,7 +3025,7 @@
           <a:p>
             <a:fld id="{DC921DF3-1FB0-45DC-97EF-461960E13574}" type="datetime1">
               <a:rPr lang="en-US" smtClean="0"/>
-              <a:t>9/5/22</a:t>
+              <a:t>10/19/22</a:t>
             </a:fld>
             <a:endParaRPr lang="en-US"/>
           </a:p>
@@ -3517,7 +3517,7 @@
           <a:p>
             <a:fld id="{092B088E-2809-46D8-B43F-738015D878CC}" type="datetime1">
               <a:rPr lang="en-US" smtClean="0"/>
-              <a:t>9/5/22</a:t>
+              <a:t>10/19/22</a:t>
             </a:fld>
             <a:endParaRPr lang="en-US"/>
           </a:p>
@@ -3712,7 +3712,7 @@
           <a:p>
             <a:fld id="{8208D42A-BC08-426E-9E11-483BA9D61AF6}" type="datetime1">
               <a:rPr lang="en-US" smtClean="0"/>
-              <a:t>9/5/22</a:t>
+              <a:t>10/19/22</a:t>
             </a:fld>
             <a:endParaRPr lang="en-US"/>
           </a:p>
@@ -3912,7 +3912,7 @@
           <a:p>
             <a:fld id="{26B28102-2E91-4DD7-8E8B-98B790A12701}" type="datetime1">
               <a:rPr lang="en-US" smtClean="0"/>
-              <a:t>9/5/22</a:t>
+              <a:t>10/19/22</a:t>
             </a:fld>
             <a:endParaRPr lang="en-US"/>
           </a:p>
@@ -4008,7 +4008,7 @@
           <a:p>
             <a:fld id="{37D5C786-44E1-4BD5-AD14-75F3EA166B5A}" type="datetime1">
               <a:rPr lang="en-US" smtClean="0"/>
-              <a:t>9/5/22</a:t>
+              <a:t>10/19/22</a:t>
             </a:fld>
             <a:endParaRPr lang="en-US"/>
           </a:p>
@@ -4219,7 +4219,7 @@
           <a:p>
             <a:fld id="{26B28102-2E91-4DD7-8E8B-98B790A12701}" type="datetime1">
               <a:rPr lang="en-US" smtClean="0"/>
-              <a:t>9/5/22</a:t>
+              <a:t>10/19/22</a:t>
             </a:fld>
             <a:endParaRPr lang="en-US"/>
           </a:p>
@@ -11111,14 +11111,14 @@
           </a:ln>
           <a:extLst>
             <a:ext uri="{909E8E84-426E-40dd-AFC4-6F175D3DCCD1}">
-              <a14:hiddenFill xmlns="" xmlns:a14="http://schemas.microsoft.com/office/drawing/2010/main">
+              <a14:hiddenFill xmlns:a14="http://schemas.microsoft.com/office/drawing/2010/main" xmlns="">
                 <a:solidFill>
                   <a:srgbClr val="FFFFFF"/>
                 </a:solidFill>
               </a14:hiddenFill>
             </a:ext>
             <a:ext uri="{91240B29-F687-4f45-9708-019B960494DF}">
-              <a14:hiddenLine xmlns="" xmlns:a14="http://schemas.microsoft.com/office/drawing/2010/main" w="9525">
+              <a14:hiddenLine xmlns:a14="http://schemas.microsoft.com/office/drawing/2010/main" xmlns="" w="9525">
                 <a:solidFill>
                   <a:srgbClr val="000000"/>
                 </a:solidFill>

</xml_diff>